<commit_message>
Seminar present and revision
</commit_message>
<xml_diff>
--- a/Seminar/PRSNT-Seminar Presentation-Jahanafrooz-011119.V1.pptx
+++ b/Seminar/PRSNT-Seminar Presentation-Jahanafrooz-011119.V1.pptx
@@ -5,33 +5,34 @@
     <p:sldMasterId id="2147483648" r:id="rId1"/>
   </p:sldMasterIdLst>
   <p:notesMasterIdLst>
-    <p:notesMasterId r:id="rId26"/>
+    <p:notesMasterId r:id="rId27"/>
   </p:notesMasterIdLst>
   <p:sldIdLst>
     <p:sldId id="256" r:id="rId2"/>
     <p:sldId id="257" r:id="rId3"/>
     <p:sldId id="258" r:id="rId4"/>
     <p:sldId id="259" r:id="rId5"/>
-    <p:sldId id="260" r:id="rId6"/>
-    <p:sldId id="261" r:id="rId7"/>
-    <p:sldId id="262" r:id="rId8"/>
-    <p:sldId id="263" r:id="rId9"/>
-    <p:sldId id="264" r:id="rId10"/>
-    <p:sldId id="265" r:id="rId11"/>
-    <p:sldId id="266" r:id="rId12"/>
-    <p:sldId id="267" r:id="rId13"/>
-    <p:sldId id="268" r:id="rId14"/>
-    <p:sldId id="269" r:id="rId15"/>
-    <p:sldId id="270" r:id="rId16"/>
-    <p:sldId id="271" r:id="rId17"/>
-    <p:sldId id="272" r:id="rId18"/>
-    <p:sldId id="273" r:id="rId19"/>
-    <p:sldId id="274" r:id="rId20"/>
-    <p:sldId id="276" r:id="rId21"/>
-    <p:sldId id="275" r:id="rId22"/>
-    <p:sldId id="277" r:id="rId23"/>
-    <p:sldId id="278" r:id="rId24"/>
-    <p:sldId id="279" r:id="rId25"/>
+    <p:sldId id="280" r:id="rId6"/>
+    <p:sldId id="260" r:id="rId7"/>
+    <p:sldId id="261" r:id="rId8"/>
+    <p:sldId id="262" r:id="rId9"/>
+    <p:sldId id="263" r:id="rId10"/>
+    <p:sldId id="264" r:id="rId11"/>
+    <p:sldId id="265" r:id="rId12"/>
+    <p:sldId id="266" r:id="rId13"/>
+    <p:sldId id="267" r:id="rId14"/>
+    <p:sldId id="268" r:id="rId15"/>
+    <p:sldId id="269" r:id="rId16"/>
+    <p:sldId id="270" r:id="rId17"/>
+    <p:sldId id="271" r:id="rId18"/>
+    <p:sldId id="272" r:id="rId19"/>
+    <p:sldId id="273" r:id="rId20"/>
+    <p:sldId id="274" r:id="rId21"/>
+    <p:sldId id="276" r:id="rId22"/>
+    <p:sldId id="275" r:id="rId23"/>
+    <p:sldId id="277" r:id="rId24"/>
+    <p:sldId id="278" r:id="rId25"/>
+    <p:sldId id="279" r:id="rId26"/>
   </p:sldIdLst>
   <p:sldSz cx="12192000" cy="6858000"/>
   <p:notesSz cx="6858000" cy="9144000"/>
@@ -1330,7 +1331,7 @@
           <a:p>
             <a:fld id="{F600F5EF-8ABB-4C2A-8879-B18784882578}" type="datetimeFigureOut">
               <a:rPr lang="en-US" smtClean="0"/>
-              <a:t>2/8/2023</a:t>
+              <a:t>2/9/2023</a:t>
             </a:fld>
             <a:endParaRPr lang="en-US"/>
           </a:p>
@@ -7808,7 +7809,7 @@
           <a:p>
             <a:fld id="{49838EA7-B6BB-4167-9CA3-F0FAC8798E42}" type="datetimeFigureOut">
               <a:rPr lang="en-US" smtClean="0"/>
-              <a:t>2/8/2023</a:t>
+              <a:t>2/9/2023</a:t>
             </a:fld>
             <a:endParaRPr lang="en-US"/>
           </a:p>
@@ -8462,6 +8463,145 @@
           <a:p>
             <a:r>
               <a:rPr lang="fa-IR" dirty="0"/>
+              <a:t>ارایه شده توسط اینتل در سال ۲۰۰۹</a:t>
+            </a:r>
+          </a:p>
+          <a:p>
+            <a:r>
+              <a:rPr lang="fa-IR" dirty="0"/>
+              <a:t>دور زدن کرنل</a:t>
+            </a:r>
+          </a:p>
+          <a:p>
+            <a:r>
+              <a:rPr lang="fa-IR" dirty="0"/>
+              <a:t>استفاده از مزیت‌های پردازنده‌های جند هسته‌ای </a:t>
+            </a:r>
+          </a:p>
+          <a:p>
+            <a:r>
+              <a:rPr lang="fa-IR" dirty="0"/>
+              <a:t>کاربردهای مختلف در ورودی/خروجی‌ها با نرخ بالا</a:t>
+            </a:r>
+          </a:p>
+          <a:p>
+            <a:r>
+              <a:rPr lang="fa-IR" dirty="0"/>
+              <a:t>مشکلات:</a:t>
+            </a:r>
+          </a:p>
+          <a:p>
+            <a:pPr lvl="1"/>
+            <a:r>
+              <a:rPr lang="fa-IR" dirty="0"/>
+              <a:t>نیاز به توسعه گرداننده رابط</a:t>
+            </a:r>
+          </a:p>
+          <a:p>
+            <a:pPr lvl="1"/>
+            <a:r>
+              <a:rPr lang="fa-IR" dirty="0"/>
+              <a:t>عدم امکان استفاده از مزیت‌ها فراهم شده توسط هسته</a:t>
+            </a:r>
+          </a:p>
+          <a:p>
+            <a:pPr lvl="1"/>
+            <a:r>
+              <a:rPr lang="fa-IR" dirty="0"/>
+              <a:t>مشکل در برقرای ارتباط با اجزای دیگر سیستم عامل</a:t>
+            </a:r>
+          </a:p>
+        </p:txBody>
+      </p:sp>
+      <p:sp>
+        <p:nvSpPr>
+          <p:cNvPr id="3" name="Text Placeholder 2">
+            <a:extLst>
+              <a:ext uri="{FF2B5EF4-FFF2-40B4-BE49-F238E27FC236}">
+                <a16:creationId xmlns:a16="http://schemas.microsoft.com/office/drawing/2014/main" id="{516DF1BD-04EE-4223-8E92-F83B3D0760BD}"/>
+              </a:ext>
+            </a:extLst>
+          </p:cNvPr>
+          <p:cNvSpPr>
+            <a:spLocks noGrp="1"/>
+          </p:cNvSpPr>
+          <p:nvPr>
+            <p:ph type="body" sz="quarter" idx="10"/>
+          </p:nvPr>
+        </p:nvSpPr>
+        <p:spPr>
+          <a:xfrm>
+            <a:off x="4804229" y="82620"/>
+            <a:ext cx="7197802" cy="720725"/>
+          </a:xfrm>
+        </p:spPr>
+        <p:txBody>
+          <a:bodyPr>
+            <a:normAutofit/>
+          </a:bodyPr>
+          <a:lstStyle/>
+          <a:p>
+            <a:r>
+              <a:rPr lang="de-DE" dirty="0"/>
+              <a:t>Data Plane Development Kit</a:t>
+            </a:r>
+            <a:endParaRPr lang="en-US" dirty="0"/>
+          </a:p>
+        </p:txBody>
+      </p:sp>
+    </p:spTree>
+    <p:extLst>
+      <p:ext uri="{BB962C8B-B14F-4D97-AF65-F5344CB8AC3E}">
+        <p14:creationId xmlns:p14="http://schemas.microsoft.com/office/powerpoint/2010/main" val="384891644"/>
+      </p:ext>
+    </p:extLst>
+  </p:cSld>
+  <p:clrMapOvr>
+    <a:masterClrMapping/>
+  </p:clrMapOvr>
+</p:sld>
+</file>
+
+<file path=ppt/slides/slide11.xml><?xml version="1.0" encoding="utf-8"?>
+<p:sld xmlns:a="http://schemas.openxmlformats.org/drawingml/2006/main" xmlns:r="http://schemas.openxmlformats.org/officeDocument/2006/relationships" xmlns:p="http://schemas.openxmlformats.org/presentationml/2006/main">
+  <p:cSld>
+    <p:spTree>
+      <p:nvGrpSpPr>
+        <p:cNvPr id="1" name=""/>
+        <p:cNvGrpSpPr/>
+        <p:nvPr/>
+      </p:nvGrpSpPr>
+      <p:grpSpPr>
+        <a:xfrm>
+          <a:off x="0" y="0"/>
+          <a:ext cx="0" cy="0"/>
+          <a:chOff x="0" y="0"/>
+          <a:chExt cx="0" cy="0"/>
+        </a:xfrm>
+      </p:grpSpPr>
+      <p:sp>
+        <p:nvSpPr>
+          <p:cNvPr id="2" name="Content Placeholder 1">
+            <a:extLst>
+              <a:ext uri="{FF2B5EF4-FFF2-40B4-BE49-F238E27FC236}">
+                <a16:creationId xmlns:a16="http://schemas.microsoft.com/office/drawing/2014/main" id="{FF49A6C7-DBE6-4D73-B240-F1117B733842}"/>
+              </a:ext>
+            </a:extLst>
+          </p:cNvPr>
+          <p:cNvSpPr>
+            <a:spLocks noGrp="1"/>
+          </p:cNvSpPr>
+          <p:nvPr>
+            <p:ph idx="1"/>
+          </p:nvPr>
+        </p:nvSpPr>
+        <p:spPr/>
+        <p:txBody>
+          <a:bodyPr/>
+          <a:lstStyle/>
+          <a:p>
+            <a:r>
+              <a:rPr lang="fa-IR" dirty="0"/>
               <a:t>ارایه شده توسط سال ۲۰۱۶</a:t>
             </a:r>
           </a:p>
@@ -9579,7 +9719,7 @@
 </p:sld>
 </file>
 
-<file path=ppt/slides/slide11.xml><?xml version="1.0" encoding="utf-8"?>
+<file path=ppt/slides/slide12.xml><?xml version="1.0" encoding="utf-8"?>
 <p:sld xmlns:a="http://schemas.openxmlformats.org/drawingml/2006/main" xmlns:r="http://schemas.openxmlformats.org/officeDocument/2006/relationships" xmlns:p="http://schemas.openxmlformats.org/presentationml/2006/main">
   <p:cSld>
     <p:spTree>
@@ -12223,7 +12363,7 @@
 </p:sld>
 </file>
 
-<file path=ppt/slides/slide12.xml><?xml version="1.0" encoding="utf-8"?>
+<file path=ppt/slides/slide13.xml><?xml version="1.0" encoding="utf-8"?>
 <p:sld xmlns:a="http://schemas.openxmlformats.org/drawingml/2006/main" xmlns:r="http://schemas.openxmlformats.org/officeDocument/2006/relationships" xmlns:p="http://schemas.openxmlformats.org/presentationml/2006/main">
   <p:cSld>
     <p:spTree>
@@ -12364,126 +12504,6 @@
     <p:extLst>
       <p:ext uri="{BB962C8B-B14F-4D97-AF65-F5344CB8AC3E}">
         <p14:creationId xmlns:p14="http://schemas.microsoft.com/office/powerpoint/2010/main" val="273446404"/>
-      </p:ext>
-    </p:extLst>
-  </p:cSld>
-  <p:clrMapOvr>
-    <a:masterClrMapping/>
-  </p:clrMapOvr>
-</p:sld>
-</file>
-
-<file path=ppt/slides/slide13.xml><?xml version="1.0" encoding="utf-8"?>
-<p:sld xmlns:a="http://schemas.openxmlformats.org/drawingml/2006/main" xmlns:r="http://schemas.openxmlformats.org/officeDocument/2006/relationships" xmlns:p="http://schemas.openxmlformats.org/presentationml/2006/main">
-  <p:cSld>
-    <p:spTree>
-      <p:nvGrpSpPr>
-        <p:cNvPr id="1" name=""/>
-        <p:cNvGrpSpPr/>
-        <p:nvPr/>
-      </p:nvGrpSpPr>
-      <p:grpSpPr>
-        <a:xfrm>
-          <a:off x="0" y="0"/>
-          <a:ext cx="0" cy="0"/>
-          <a:chOff x="0" y="0"/>
-          <a:chExt cx="0" cy="0"/>
-        </a:xfrm>
-      </p:grpSpPr>
-      <p:sp>
-        <p:nvSpPr>
-          <p:cNvPr id="2" name="Content Placeholder 1">
-            <a:extLst>
-              <a:ext uri="{FF2B5EF4-FFF2-40B4-BE49-F238E27FC236}">
-                <a16:creationId xmlns:a16="http://schemas.microsoft.com/office/drawing/2014/main" id="{D5692766-411E-464C-B453-2504D542464B}"/>
-              </a:ext>
-            </a:extLst>
-          </p:cNvPr>
-          <p:cNvSpPr>
-            <a:spLocks noGrp="1"/>
-          </p:cNvSpPr>
-          <p:nvPr>
-            <p:ph idx="1"/>
-          </p:nvPr>
-        </p:nvSpPr>
-        <p:spPr/>
-        <p:txBody>
-          <a:bodyPr/>
-          <a:lstStyle/>
-          <a:p>
-            <a:r>
-              <a:rPr lang="fa-IR" dirty="0"/>
-              <a:t>مبتنی بر امضا</a:t>
-            </a:r>
-            <a:endParaRPr lang="de-DE" dirty="0"/>
-          </a:p>
-          <a:p>
-            <a:r>
-              <a:rPr lang="fa-IR" dirty="0"/>
-              <a:t>استفاده از راه‌گزین‌های برنامه‌پذیر سطح داده</a:t>
-            </a:r>
-          </a:p>
-          <a:p>
-            <a:r>
-              <a:rPr lang="fa-IR" dirty="0"/>
-              <a:t>مشکلات</a:t>
-            </a:r>
-          </a:p>
-          <a:p>
-            <a:pPr lvl="1"/>
-            <a:r>
-              <a:rPr lang="fa-IR" dirty="0"/>
-              <a:t> عدم کارایی در شناسایی حملات با الگوهای متنوع</a:t>
-            </a:r>
-          </a:p>
-          <a:p>
-            <a:pPr lvl="1"/>
-            <a:r>
-              <a:rPr lang="fa-IR" dirty="0"/>
-              <a:t>عدم صحبت در مورد نحوه یاددهی مدل‌ها</a:t>
-            </a:r>
-            <a:endParaRPr lang="en-US" dirty="0"/>
-          </a:p>
-        </p:txBody>
-      </p:sp>
-      <p:sp>
-        <p:nvSpPr>
-          <p:cNvPr id="3" name="Text Placeholder 2">
-            <a:extLst>
-              <a:ext uri="{FF2B5EF4-FFF2-40B4-BE49-F238E27FC236}">
-                <a16:creationId xmlns:a16="http://schemas.microsoft.com/office/drawing/2014/main" id="{CC7FDB0E-080A-465E-A54B-C6CC4D207927}"/>
-              </a:ext>
-            </a:extLst>
-          </p:cNvPr>
-          <p:cNvSpPr>
-            <a:spLocks noGrp="1"/>
-          </p:cNvSpPr>
-          <p:nvPr>
-            <p:ph type="body" sz="quarter" idx="10"/>
-          </p:nvPr>
-        </p:nvSpPr>
-        <p:spPr>
-          <a:xfrm>
-            <a:off x="8101013" y="82620"/>
-            <a:ext cx="3901018" cy="720725"/>
-          </a:xfrm>
-        </p:spPr>
-        <p:txBody>
-          <a:bodyPr/>
-          <a:lstStyle/>
-          <a:p>
-            <a:r>
-              <a:rPr lang="fa-IR" dirty="0"/>
-              <a:t>دیمیلانیوس ۲۰۲۱</a:t>
-            </a:r>
-            <a:endParaRPr lang="en-US" dirty="0"/>
-          </a:p>
-        </p:txBody>
-      </p:sp>
-    </p:spTree>
-    <p:extLst>
-      <p:ext uri="{BB962C8B-B14F-4D97-AF65-F5344CB8AC3E}">
-        <p14:creationId xmlns:p14="http://schemas.microsoft.com/office/powerpoint/2010/main" val="3426720858"/>
       </p:ext>
     </p:extLst>
   </p:cSld>
@@ -12535,28 +12555,13 @@
               <a:rPr lang="fa-IR" dirty="0"/>
               <a:t>مبتنی بر امضا</a:t>
             </a:r>
+            <a:endParaRPr lang="de-DE" dirty="0"/>
           </a:p>
           <a:p>
             <a:r>
               <a:rPr lang="fa-IR" dirty="0"/>
-              <a:t>تولید امضای سازگار با </a:t>
-            </a:r>
-            <a:r>
-              <a:rPr lang="de-DE" dirty="0"/>
-              <a:t>Snort</a:t>
-            </a:r>
-            <a:endParaRPr lang="fa-IR" dirty="0"/>
-          </a:p>
-          <a:p>
-            <a:r>
-              <a:rPr lang="fa-IR" dirty="0"/>
-              <a:t>دسته‌بندی جریان مبتنی بر </a:t>
-            </a:r>
-            <a:r>
-              <a:rPr lang="de-DE" dirty="0"/>
-              <a:t>IPFIX</a:t>
-            </a:r>
-            <a:endParaRPr lang="fa-IR" dirty="0"/>
+              <a:t>استفاده از راه‌گزین‌های برنامه‌پذیر سطح داده</a:t>
+            </a:r>
           </a:p>
           <a:p>
             <a:r>
@@ -12570,6 +12575,14 @@
               <a:rPr lang="fa-IR" dirty="0"/>
               <a:t> عدم کارایی در شناسایی حملات با الگوهای متنوع</a:t>
             </a:r>
+          </a:p>
+          <a:p>
+            <a:pPr lvl="1"/>
+            <a:r>
+              <a:rPr lang="fa-IR" dirty="0"/>
+              <a:t>عدم صحبت در مورد نحوه یاددهی مدل‌ها</a:t>
+            </a:r>
+            <a:endParaRPr lang="en-US" dirty="0"/>
           </a:p>
         </p:txBody>
       </p:sp>
@@ -12601,7 +12614,7 @@
           <a:p>
             <a:r>
               <a:rPr lang="fa-IR" dirty="0"/>
-              <a:t>ارلاکر ۲۰۲۰</a:t>
+              <a:t>دیمیلانیوس ۲۰۲۱</a:t>
             </a:r>
             <a:endParaRPr lang="en-US" dirty="0"/>
           </a:p>
@@ -12610,7 +12623,7 @@
     </p:spTree>
     <p:extLst>
       <p:ext uri="{BB962C8B-B14F-4D97-AF65-F5344CB8AC3E}">
-        <p14:creationId xmlns:p14="http://schemas.microsoft.com/office/powerpoint/2010/main" val="2470580496"/>
+        <p14:creationId xmlns:p14="http://schemas.microsoft.com/office/powerpoint/2010/main" val="3426720858"/>
       </p:ext>
     </p:extLst>
   </p:cSld>
@@ -12642,7 +12655,7 @@
           <p:cNvPr id="2" name="Content Placeholder 1">
             <a:extLst>
               <a:ext uri="{FF2B5EF4-FFF2-40B4-BE49-F238E27FC236}">
-                <a16:creationId xmlns:a16="http://schemas.microsoft.com/office/drawing/2014/main" id="{FCAA3253-F3BF-4200-8497-03095B37E742}"/>
+                <a16:creationId xmlns:a16="http://schemas.microsoft.com/office/drawing/2014/main" id="{D5692766-411E-464C-B453-2504D542464B}"/>
               </a:ext>
             </a:extLst>
           </p:cNvPr>
@@ -12660,31 +12673,43 @@
           <a:p>
             <a:r>
               <a:rPr lang="fa-IR" dirty="0"/>
-              <a:t>جمع‌آوری اطلاعات آماری توسط راه‌گزین‌های برنامه‌پذیر با استفاده از زبان </a:t>
+              <a:t>مبتنی بر امضا</a:t>
+            </a:r>
+          </a:p>
+          <a:p>
+            <a:r>
+              <a:rPr lang="fa-IR" dirty="0"/>
+              <a:t>تولید امضای سازگار با </a:t>
             </a:r>
             <a:r>
               <a:rPr lang="de-DE" dirty="0"/>
-              <a:t>P4</a:t>
-            </a:r>
+              <a:t>Snort</a:t>
+            </a:r>
+            <a:endParaRPr lang="fa-IR" dirty="0"/>
           </a:p>
           <a:p>
             <a:r>
               <a:rPr lang="fa-IR" dirty="0"/>
-              <a:t>یک کنترل‌کننده مرکزی به منظور تشخیص و مدیریت مقابله با حملات</a:t>
-            </a:r>
+              <a:t>دسته‌بندی جریان مبتنی بر </a:t>
+            </a:r>
+            <a:r>
+              <a:rPr lang="de-DE" dirty="0"/>
+              <a:t>IPFIX</a:t>
+            </a:r>
+            <a:endParaRPr lang="fa-IR" dirty="0"/>
           </a:p>
           <a:p>
             <a:r>
               <a:rPr lang="fa-IR" dirty="0"/>
-              <a:t>عدم وارسی محتوای کامل بسته‌ها </a:t>
-            </a:r>
-            <a:r>
-              <a:rPr lang="fa-IR" dirty="0">
-                <a:sym typeface="Wingdings" panose="05000000000000000000" pitchFamily="2" charset="2"/>
-              </a:rPr>
-              <a:t> عدم کارایی در تنوع پروتکلی</a:t>
-            </a:r>
-            <a:endParaRPr lang="en-US" dirty="0"/>
+              <a:t>مشکلات</a:t>
+            </a:r>
+          </a:p>
+          <a:p>
+            <a:pPr lvl="1"/>
+            <a:r>
+              <a:rPr lang="fa-IR" dirty="0"/>
+              <a:t> عدم کارایی در شناسایی حملات با الگوهای متنوع</a:t>
+            </a:r>
           </a:p>
         </p:txBody>
       </p:sp>
@@ -12693,7 +12718,7 @@
           <p:cNvPr id="3" name="Text Placeholder 2">
             <a:extLst>
               <a:ext uri="{FF2B5EF4-FFF2-40B4-BE49-F238E27FC236}">
-                <a16:creationId xmlns:a16="http://schemas.microsoft.com/office/drawing/2014/main" id="{BDEBE0D6-6D58-4E9E-9A47-96F94DAEE24A}"/>
+                <a16:creationId xmlns:a16="http://schemas.microsoft.com/office/drawing/2014/main" id="{CC7FDB0E-080A-465E-A54B-C6CC4D207927}"/>
               </a:ext>
             </a:extLst>
           </p:cNvPr>
@@ -12704,14 +12729,19 @@
             <p:ph type="body" sz="quarter" idx="10"/>
           </p:nvPr>
         </p:nvSpPr>
-        <p:spPr/>
+        <p:spPr>
+          <a:xfrm>
+            <a:off x="8101013" y="82620"/>
+            <a:ext cx="3901018" cy="720725"/>
+          </a:xfrm>
+        </p:spPr>
         <p:txBody>
           <a:bodyPr/>
           <a:lstStyle/>
           <a:p>
             <a:r>
               <a:rPr lang="fa-IR" dirty="0"/>
-              <a:t>جاکن ۲۰۲۱</a:t>
+              <a:t>ارلاکر ۲۰۲۰</a:t>
             </a:r>
             <a:endParaRPr lang="en-US" dirty="0"/>
           </a:p>
@@ -12720,7 +12750,7 @@
     </p:spTree>
     <p:extLst>
       <p:ext uri="{BB962C8B-B14F-4D97-AF65-F5344CB8AC3E}">
-        <p14:creationId xmlns:p14="http://schemas.microsoft.com/office/powerpoint/2010/main" val="4256431803"/>
+        <p14:creationId xmlns:p14="http://schemas.microsoft.com/office/powerpoint/2010/main" val="2470580496"/>
       </p:ext>
     </p:extLst>
   </p:cSld>
@@ -12752,7 +12782,7 @@
           <p:cNvPr id="2" name="Content Placeholder 1">
             <a:extLst>
               <a:ext uri="{FF2B5EF4-FFF2-40B4-BE49-F238E27FC236}">
-                <a16:creationId xmlns:a16="http://schemas.microsoft.com/office/drawing/2014/main" id="{DEC3BD49-EE62-4422-BB08-4934BD2E13E9}"/>
+                <a16:creationId xmlns:a16="http://schemas.microsoft.com/office/drawing/2014/main" id="{FCAA3253-F3BF-4200-8497-03095B37E742}"/>
               </a:ext>
             </a:extLst>
           </p:cNvPr>
@@ -12770,25 +12800,29 @@
           <a:p>
             <a:r>
               <a:rPr lang="fa-IR" dirty="0"/>
-              <a:t>جمع‌آوری اطلاعات آماری بسته‌ها</a:t>
+              <a:t>جمع‌آوری اطلاعات آماری توسط راه‌گزین‌های برنامه‌پذیر با استفاده از زبان </a:t>
+            </a:r>
+            <a:r>
+              <a:rPr lang="de-DE" dirty="0"/>
+              <a:t>P4</a:t>
             </a:r>
           </a:p>
           <a:p>
             <a:r>
               <a:rPr lang="fa-IR" dirty="0"/>
-              <a:t>شناسایی قربانی بودن یک آدرس به کمک نامتوازن بودن مقادیر یک ویژگی خاص</a:t>
+              <a:t>یک کنترل‌کننده مرکزی به منظور تشخیص و مدیریت مقابله با حملات</a:t>
             </a:r>
           </a:p>
           <a:p>
             <a:r>
               <a:rPr lang="fa-IR" dirty="0"/>
-              <a:t>استفاده از انگاره‌ها</a:t>
-            </a:r>
-          </a:p>
-          <a:p>
-            <a:r>
-              <a:rPr lang="fa-IR" dirty="0"/>
-              <a:t>ویژگی‌های نشان‌دهنده وقوع حمله؟</a:t>
+              <a:t>عدم وارسی محتوای کامل بسته‌ها </a:t>
+            </a:r>
+            <a:r>
+              <a:rPr lang="fa-IR" dirty="0">
+                <a:sym typeface="Wingdings" panose="05000000000000000000" pitchFamily="2" charset="2"/>
+              </a:rPr>
+              <a:t> عدم کارایی در تنوع پروتکلی</a:t>
             </a:r>
             <a:endParaRPr lang="en-US" dirty="0"/>
           </a:p>
@@ -12799,7 +12833,7 @@
           <p:cNvPr id="3" name="Text Placeholder 2">
             <a:extLst>
               <a:ext uri="{FF2B5EF4-FFF2-40B4-BE49-F238E27FC236}">
-                <a16:creationId xmlns:a16="http://schemas.microsoft.com/office/drawing/2014/main" id="{9F01E7D4-EE37-42B3-BB69-D5AF712DA154}"/>
+                <a16:creationId xmlns:a16="http://schemas.microsoft.com/office/drawing/2014/main" id="{BDEBE0D6-6D58-4E9E-9A47-96F94DAEE24A}"/>
               </a:ext>
             </a:extLst>
           </p:cNvPr>
@@ -12810,19 +12844,14 @@
             <p:ph type="body" sz="quarter" idx="10"/>
           </p:nvPr>
         </p:nvSpPr>
-        <p:spPr>
-          <a:xfrm>
-            <a:off x="7100888" y="82620"/>
-            <a:ext cx="4901143" cy="720725"/>
-          </a:xfrm>
-        </p:spPr>
+        <p:spPr/>
         <p:txBody>
           <a:bodyPr/>
           <a:lstStyle/>
           <a:p>
             <a:r>
               <a:rPr lang="fa-IR" dirty="0"/>
-              <a:t>آر.تی.سد ۲۰۲۱</a:t>
+              <a:t>جاکن ۲۰۲۱</a:t>
             </a:r>
             <a:endParaRPr lang="en-US" dirty="0"/>
           </a:p>
@@ -12831,7 +12860,7 @@
     </p:spTree>
     <p:extLst>
       <p:ext uri="{BB962C8B-B14F-4D97-AF65-F5344CB8AC3E}">
-        <p14:creationId xmlns:p14="http://schemas.microsoft.com/office/powerpoint/2010/main" val="2700712716"/>
+        <p14:creationId xmlns:p14="http://schemas.microsoft.com/office/powerpoint/2010/main" val="4256431803"/>
       </p:ext>
     </p:extLst>
   </p:cSld>
@@ -12863,7 +12892,7 @@
           <p:cNvPr id="2" name="Content Placeholder 1">
             <a:extLst>
               <a:ext uri="{FF2B5EF4-FFF2-40B4-BE49-F238E27FC236}">
-                <a16:creationId xmlns:a16="http://schemas.microsoft.com/office/drawing/2014/main" id="{03A0832A-4108-45AD-BD1F-C5606B545A43}"/>
+                <a16:creationId xmlns:a16="http://schemas.microsoft.com/office/drawing/2014/main" id="{DEC3BD49-EE62-4422-BB08-4934BD2E13E9}"/>
               </a:ext>
             </a:extLst>
           </p:cNvPr>
@@ -12881,19 +12910,25 @@
           <a:p>
             <a:r>
               <a:rPr lang="fa-IR" dirty="0"/>
-              <a:t>استفاده از شبکه‌های عصبی عمیق در سمت لبه مشتری</a:t>
+              <a:t>جمع‌آوری اطلاعات آماری بسته‌ها</a:t>
             </a:r>
           </a:p>
           <a:p>
             <a:r>
               <a:rPr lang="fa-IR" dirty="0"/>
-              <a:t>استفاده از شبکه‌های عصبی عمیق با الگوریتم‌های پیشرفته‌تر در سمت فراهم‌کننده </a:t>
+              <a:t>شناسایی قربانی بودن یک آدرس به کمک نامتوازن بودن مقادیر یک ویژگی خاص</a:t>
             </a:r>
           </a:p>
           <a:p>
             <a:r>
               <a:rPr lang="fa-IR" dirty="0"/>
-              <a:t>عدم ارایه راهکاری بهینه به منظور آموزش مجدد شبکه‌های عصبی</a:t>
+              <a:t>استفاده از انگاره‌ها</a:t>
+            </a:r>
+          </a:p>
+          <a:p>
+            <a:r>
+              <a:rPr lang="fa-IR" dirty="0"/>
+              <a:t>ویژگی‌های نشان‌دهنده وقوع حمله؟</a:t>
             </a:r>
             <a:endParaRPr lang="en-US" dirty="0"/>
           </a:p>
@@ -12904,7 +12939,7 @@
           <p:cNvPr id="3" name="Text Placeholder 2">
             <a:extLst>
               <a:ext uri="{FF2B5EF4-FFF2-40B4-BE49-F238E27FC236}">
-                <a16:creationId xmlns:a16="http://schemas.microsoft.com/office/drawing/2014/main" id="{85737448-7177-4819-B9E4-6CBBAA0A0904}"/>
+                <a16:creationId xmlns:a16="http://schemas.microsoft.com/office/drawing/2014/main" id="{9F01E7D4-EE37-42B3-BB69-D5AF712DA154}"/>
               </a:ext>
             </a:extLst>
           </p:cNvPr>
@@ -12915,14 +12950,19 @@
             <p:ph type="body" sz="quarter" idx="10"/>
           </p:nvPr>
         </p:nvSpPr>
-        <p:spPr/>
+        <p:spPr>
+          <a:xfrm>
+            <a:off x="7100888" y="82620"/>
+            <a:ext cx="4901143" cy="720725"/>
+          </a:xfrm>
+        </p:spPr>
         <p:txBody>
           <a:bodyPr/>
           <a:lstStyle/>
           <a:p>
             <a:r>
               <a:rPr lang="fa-IR" dirty="0"/>
-              <a:t>دفاع هوشمند ۲۰۲۲</a:t>
+              <a:t>آر.تی.سد ۲۰۲۱</a:t>
             </a:r>
             <a:endParaRPr lang="en-US" dirty="0"/>
           </a:p>
@@ -12931,7 +12971,7 @@
     </p:spTree>
     <p:extLst>
       <p:ext uri="{BB962C8B-B14F-4D97-AF65-F5344CB8AC3E}">
-        <p14:creationId xmlns:p14="http://schemas.microsoft.com/office/powerpoint/2010/main" val="2786828307"/>
+        <p14:creationId xmlns:p14="http://schemas.microsoft.com/office/powerpoint/2010/main" val="2700712716"/>
       </p:ext>
     </p:extLst>
   </p:cSld>
@@ -12963,6 +13003,106 @@
           <p:cNvPr id="2" name="Content Placeholder 1">
             <a:extLst>
               <a:ext uri="{FF2B5EF4-FFF2-40B4-BE49-F238E27FC236}">
+                <a16:creationId xmlns:a16="http://schemas.microsoft.com/office/drawing/2014/main" id="{03A0832A-4108-45AD-BD1F-C5606B545A43}"/>
+              </a:ext>
+            </a:extLst>
+          </p:cNvPr>
+          <p:cNvSpPr>
+            <a:spLocks noGrp="1"/>
+          </p:cNvSpPr>
+          <p:nvPr>
+            <p:ph idx="1"/>
+          </p:nvPr>
+        </p:nvSpPr>
+        <p:spPr/>
+        <p:txBody>
+          <a:bodyPr/>
+          <a:lstStyle/>
+          <a:p>
+            <a:r>
+              <a:rPr lang="fa-IR" dirty="0"/>
+              <a:t>استفاده از شبکه‌های عصبی عمیق در سمت لبه مشتری</a:t>
+            </a:r>
+          </a:p>
+          <a:p>
+            <a:r>
+              <a:rPr lang="fa-IR" dirty="0"/>
+              <a:t>استفاده از شبکه‌های عصبی عمیق با الگوریتم‌های پیشرفته‌تر در سمت فراهم‌کننده </a:t>
+            </a:r>
+          </a:p>
+          <a:p>
+            <a:r>
+              <a:rPr lang="fa-IR" dirty="0"/>
+              <a:t>عدم ارایه راهکاری بهینه به منظور آموزش مجدد شبکه‌های عصبی</a:t>
+            </a:r>
+            <a:endParaRPr lang="en-US" dirty="0"/>
+          </a:p>
+        </p:txBody>
+      </p:sp>
+      <p:sp>
+        <p:nvSpPr>
+          <p:cNvPr id="3" name="Text Placeholder 2">
+            <a:extLst>
+              <a:ext uri="{FF2B5EF4-FFF2-40B4-BE49-F238E27FC236}">
+                <a16:creationId xmlns:a16="http://schemas.microsoft.com/office/drawing/2014/main" id="{85737448-7177-4819-B9E4-6CBBAA0A0904}"/>
+              </a:ext>
+            </a:extLst>
+          </p:cNvPr>
+          <p:cNvSpPr>
+            <a:spLocks noGrp="1"/>
+          </p:cNvSpPr>
+          <p:nvPr>
+            <p:ph type="body" sz="quarter" idx="10"/>
+          </p:nvPr>
+        </p:nvSpPr>
+        <p:spPr/>
+        <p:txBody>
+          <a:bodyPr/>
+          <a:lstStyle/>
+          <a:p>
+            <a:r>
+              <a:rPr lang="fa-IR" dirty="0"/>
+              <a:t>دفاع هوشمند ۲۰۲۲</a:t>
+            </a:r>
+            <a:endParaRPr lang="en-US" dirty="0"/>
+          </a:p>
+        </p:txBody>
+      </p:sp>
+    </p:spTree>
+    <p:extLst>
+      <p:ext uri="{BB962C8B-B14F-4D97-AF65-F5344CB8AC3E}">
+        <p14:creationId xmlns:p14="http://schemas.microsoft.com/office/powerpoint/2010/main" val="2786828307"/>
+      </p:ext>
+    </p:extLst>
+  </p:cSld>
+  <p:clrMapOvr>
+    <a:masterClrMapping/>
+  </p:clrMapOvr>
+</p:sld>
+</file>
+
+<file path=ppt/slides/slide19.xml><?xml version="1.0" encoding="utf-8"?>
+<p:sld xmlns:a="http://schemas.openxmlformats.org/drawingml/2006/main" xmlns:r="http://schemas.openxmlformats.org/officeDocument/2006/relationships" xmlns:p="http://schemas.openxmlformats.org/presentationml/2006/main">
+  <p:cSld>
+    <p:spTree>
+      <p:nvGrpSpPr>
+        <p:cNvPr id="1" name=""/>
+        <p:cNvGrpSpPr/>
+        <p:nvPr/>
+      </p:nvGrpSpPr>
+      <p:grpSpPr>
+        <a:xfrm>
+          <a:off x="0" y="0"/>
+          <a:ext cx="0" cy="0"/>
+          <a:chOff x="0" y="0"/>
+          <a:chExt cx="0" cy="0"/>
+        </a:xfrm>
+      </p:grpSpPr>
+      <p:sp>
+        <p:nvSpPr>
+          <p:cNvPr id="2" name="Content Placeholder 1">
+            <a:extLst>
+              <a:ext uri="{FF2B5EF4-FFF2-40B4-BE49-F238E27FC236}">
                 <a16:creationId xmlns:a16="http://schemas.microsoft.com/office/drawing/2014/main" id="{3EC3ACB7-5C8B-4702-89E7-54B681926AC7}"/>
               </a:ext>
             </a:extLst>
@@ -13047,7 +13187,117 @@
 </p:sld>
 </file>
 
-<file path=ppt/slides/slide19.xml><?xml version="1.0" encoding="utf-8"?>
+<file path=ppt/slides/slide2.xml><?xml version="1.0" encoding="utf-8"?>
+<p:sld xmlns:a="http://schemas.openxmlformats.org/drawingml/2006/main" xmlns:r="http://schemas.openxmlformats.org/officeDocument/2006/relationships" xmlns:p="http://schemas.openxmlformats.org/presentationml/2006/main">
+  <p:cSld>
+    <p:spTree>
+      <p:nvGrpSpPr>
+        <p:cNvPr id="1" name=""/>
+        <p:cNvGrpSpPr/>
+        <p:nvPr/>
+      </p:nvGrpSpPr>
+      <p:grpSpPr>
+        <a:xfrm>
+          <a:off x="0" y="0"/>
+          <a:ext cx="0" cy="0"/>
+          <a:chOff x="0" y="0"/>
+          <a:chExt cx="0" cy="0"/>
+        </a:xfrm>
+      </p:grpSpPr>
+      <p:sp>
+        <p:nvSpPr>
+          <p:cNvPr id="2" name="Content Placeholder 1">
+            <a:extLst>
+              <a:ext uri="{FF2B5EF4-FFF2-40B4-BE49-F238E27FC236}">
+                <a16:creationId xmlns:a16="http://schemas.microsoft.com/office/drawing/2014/main" id="{01B25140-B816-4B99-99AC-D6D6E657FBCC}"/>
+              </a:ext>
+            </a:extLst>
+          </p:cNvPr>
+          <p:cNvSpPr>
+            <a:spLocks noGrp="1"/>
+          </p:cNvSpPr>
+          <p:nvPr>
+            <p:ph idx="1"/>
+          </p:nvPr>
+        </p:nvSpPr>
+        <p:spPr/>
+        <p:txBody>
+          <a:bodyPr/>
+          <a:lstStyle/>
+          <a:p>
+            <a:r>
+              <a:rPr lang="fa-IR" dirty="0"/>
+              <a:t>فراگیر شدن اپلیکیشن های مختلف تنوع ترافيك پروتكل‌هاي مختلف و رفتار‌هاي متفاوت در ترافيك شبكه</a:t>
+            </a:r>
+          </a:p>
+          <a:p>
+            <a:r>
+              <a:rPr lang="fa-IR" dirty="0"/>
+              <a:t>افزايش حملات منع خدمت (توزيع‌شده)</a:t>
+            </a:r>
+          </a:p>
+          <a:p>
+            <a:r>
+              <a:rPr lang="fa-IR" dirty="0"/>
+              <a:t>مشكلات روش‌هاي پيشين: عدم تطبيق پذيري، عدم مقياس پذيري </a:t>
+            </a:r>
+            <a:r>
+              <a:rPr lang="fa-IR" dirty="0">
+                <a:sym typeface="Wingdings" panose="05000000000000000000" pitchFamily="2" charset="2"/>
+              </a:rPr>
+              <a:t> پردازش جامع و تطبیق پذیر با تنوع ترافیکی</a:t>
+            </a:r>
+            <a:endParaRPr lang="fa-IR" dirty="0"/>
+          </a:p>
+          <a:p>
+            <a:pPr lvl="4"/>
+            <a:endParaRPr lang="en-US" dirty="0"/>
+          </a:p>
+        </p:txBody>
+      </p:sp>
+      <p:sp>
+        <p:nvSpPr>
+          <p:cNvPr id="3" name="Text Placeholder 2">
+            <a:extLst>
+              <a:ext uri="{FF2B5EF4-FFF2-40B4-BE49-F238E27FC236}">
+                <a16:creationId xmlns:a16="http://schemas.microsoft.com/office/drawing/2014/main" id="{2B32CC1A-0841-48A8-913B-4A31DA7D230A}"/>
+              </a:ext>
+            </a:extLst>
+          </p:cNvPr>
+          <p:cNvSpPr>
+            <a:spLocks noGrp="1"/>
+          </p:cNvSpPr>
+          <p:nvPr>
+            <p:ph type="body" sz="quarter" idx="10"/>
+          </p:nvPr>
+        </p:nvSpPr>
+        <p:spPr/>
+        <p:txBody>
+          <a:bodyPr/>
+          <a:lstStyle/>
+          <a:p>
+            <a:r>
+              <a:rPr lang="fa-IR" dirty="0"/>
+              <a:t>طرح مسئله</a:t>
+            </a:r>
+            <a:endParaRPr lang="en-US" dirty="0"/>
+          </a:p>
+        </p:txBody>
+      </p:sp>
+    </p:spTree>
+    <p:extLst>
+      <p:ext uri="{BB962C8B-B14F-4D97-AF65-F5344CB8AC3E}">
+        <p14:creationId xmlns:p14="http://schemas.microsoft.com/office/powerpoint/2010/main" val="2328731544"/>
+      </p:ext>
+    </p:extLst>
+  </p:cSld>
+  <p:clrMapOvr>
+    <a:masterClrMapping/>
+  </p:clrMapOvr>
+</p:sld>
+</file>
+
+<file path=ppt/slides/slide20.xml><?xml version="1.0" encoding="utf-8"?>
 <p:sld xmlns:a="http://schemas.openxmlformats.org/drawingml/2006/main" xmlns:r="http://schemas.openxmlformats.org/officeDocument/2006/relationships" xmlns:p="http://schemas.openxmlformats.org/presentationml/2006/main">
   <p:cSld>
     <p:spTree>
@@ -13171,117 +13421,7 @@
 </p:sld>
 </file>
 
-<file path=ppt/slides/slide2.xml><?xml version="1.0" encoding="utf-8"?>
-<p:sld xmlns:a="http://schemas.openxmlformats.org/drawingml/2006/main" xmlns:r="http://schemas.openxmlformats.org/officeDocument/2006/relationships" xmlns:p="http://schemas.openxmlformats.org/presentationml/2006/main">
-  <p:cSld>
-    <p:spTree>
-      <p:nvGrpSpPr>
-        <p:cNvPr id="1" name=""/>
-        <p:cNvGrpSpPr/>
-        <p:nvPr/>
-      </p:nvGrpSpPr>
-      <p:grpSpPr>
-        <a:xfrm>
-          <a:off x="0" y="0"/>
-          <a:ext cx="0" cy="0"/>
-          <a:chOff x="0" y="0"/>
-          <a:chExt cx="0" cy="0"/>
-        </a:xfrm>
-      </p:grpSpPr>
-      <p:sp>
-        <p:nvSpPr>
-          <p:cNvPr id="2" name="Content Placeholder 1">
-            <a:extLst>
-              <a:ext uri="{FF2B5EF4-FFF2-40B4-BE49-F238E27FC236}">
-                <a16:creationId xmlns:a16="http://schemas.microsoft.com/office/drawing/2014/main" id="{01B25140-B816-4B99-99AC-D6D6E657FBCC}"/>
-              </a:ext>
-            </a:extLst>
-          </p:cNvPr>
-          <p:cNvSpPr>
-            <a:spLocks noGrp="1"/>
-          </p:cNvSpPr>
-          <p:nvPr>
-            <p:ph idx="1"/>
-          </p:nvPr>
-        </p:nvSpPr>
-        <p:spPr/>
-        <p:txBody>
-          <a:bodyPr/>
-          <a:lstStyle/>
-          <a:p>
-            <a:r>
-              <a:rPr lang="fa-IR" dirty="0"/>
-              <a:t>فراگیر شدن اپلیکیشن های مختلف تنوع ترافيك پروتكل‌هاي مختلف و رفتار‌هاي متفاوت در ترافيك شبكه</a:t>
-            </a:r>
-          </a:p>
-          <a:p>
-            <a:r>
-              <a:rPr lang="fa-IR" dirty="0"/>
-              <a:t>افزايش حملات منع خدمت (توزيع‌شده)</a:t>
-            </a:r>
-          </a:p>
-          <a:p>
-            <a:r>
-              <a:rPr lang="fa-IR" dirty="0"/>
-              <a:t>مشكلات روش‌هاي پيشين: عدم تطبيق پذيري، عدم مقياس پذيري </a:t>
-            </a:r>
-            <a:r>
-              <a:rPr lang="fa-IR" dirty="0">
-                <a:sym typeface="Wingdings" panose="05000000000000000000" pitchFamily="2" charset="2"/>
-              </a:rPr>
-              <a:t> پردازش جامع و تطبیق پذیر با تنوع ترافیکی</a:t>
-            </a:r>
-            <a:endParaRPr lang="fa-IR" dirty="0"/>
-          </a:p>
-          <a:p>
-            <a:pPr lvl="4"/>
-            <a:endParaRPr lang="en-US" dirty="0"/>
-          </a:p>
-        </p:txBody>
-      </p:sp>
-      <p:sp>
-        <p:nvSpPr>
-          <p:cNvPr id="3" name="Text Placeholder 2">
-            <a:extLst>
-              <a:ext uri="{FF2B5EF4-FFF2-40B4-BE49-F238E27FC236}">
-                <a16:creationId xmlns:a16="http://schemas.microsoft.com/office/drawing/2014/main" id="{2B32CC1A-0841-48A8-913B-4A31DA7D230A}"/>
-              </a:ext>
-            </a:extLst>
-          </p:cNvPr>
-          <p:cNvSpPr>
-            <a:spLocks noGrp="1"/>
-          </p:cNvSpPr>
-          <p:nvPr>
-            <p:ph type="body" sz="quarter" idx="10"/>
-          </p:nvPr>
-        </p:nvSpPr>
-        <p:spPr/>
-        <p:txBody>
-          <a:bodyPr/>
-          <a:lstStyle/>
-          <a:p>
-            <a:r>
-              <a:rPr lang="fa-IR" dirty="0"/>
-              <a:t>طرح مسئله</a:t>
-            </a:r>
-            <a:endParaRPr lang="en-US" dirty="0"/>
-          </a:p>
-        </p:txBody>
-      </p:sp>
-    </p:spTree>
-    <p:extLst>
-      <p:ext uri="{BB962C8B-B14F-4D97-AF65-F5344CB8AC3E}">
-        <p14:creationId xmlns:p14="http://schemas.microsoft.com/office/powerpoint/2010/main" val="2328731544"/>
-      </p:ext>
-    </p:extLst>
-  </p:cSld>
-  <p:clrMapOvr>
-    <a:masterClrMapping/>
-  </p:clrMapOvr>
-</p:sld>
-</file>
-
-<file path=ppt/slides/slide20.xml><?xml version="1.0" encoding="utf-8"?>
+<file path=ppt/slides/slide21.xml><?xml version="1.0" encoding="utf-8"?>
 <p:sld xmlns:a="http://schemas.openxmlformats.org/drawingml/2006/main" xmlns:r="http://schemas.openxmlformats.org/officeDocument/2006/relationships" xmlns:p="http://schemas.openxmlformats.org/presentationml/2006/main">
   <p:cSld>
     <p:spTree>
@@ -13379,7 +13519,7 @@
 </p:sld>
 </file>
 
-<file path=ppt/slides/slide21.xml><?xml version="1.0" encoding="utf-8"?>
+<file path=ppt/slides/slide22.xml><?xml version="1.0" encoding="utf-8"?>
 <p:sld xmlns:a="http://schemas.openxmlformats.org/drawingml/2006/main" xmlns:r="http://schemas.openxmlformats.org/officeDocument/2006/relationships" xmlns:p="http://schemas.openxmlformats.org/presentationml/2006/main">
   <p:cSld>
     <p:spTree>
@@ -14117,558 +14257,6 @@
 </p:sld>
 </file>
 
-<file path=ppt/slides/slide22.xml><?xml version="1.0" encoding="utf-8"?>
-<p:sld xmlns:a="http://schemas.openxmlformats.org/drawingml/2006/main" xmlns:r="http://schemas.openxmlformats.org/officeDocument/2006/relationships" xmlns:p="http://schemas.openxmlformats.org/presentationml/2006/main">
-  <p:cSld>
-    <p:spTree>
-      <p:nvGrpSpPr>
-        <p:cNvPr id="1" name=""/>
-        <p:cNvGrpSpPr/>
-        <p:nvPr/>
-      </p:nvGrpSpPr>
-      <p:grpSpPr>
-        <a:xfrm>
-          <a:off x="0" y="0"/>
-          <a:ext cx="0" cy="0"/>
-          <a:chOff x="0" y="0"/>
-          <a:chExt cx="0" cy="0"/>
-        </a:xfrm>
-      </p:grpSpPr>
-      <p:sp>
-        <p:nvSpPr>
-          <p:cNvPr id="4" name="Content Placeholder 3">
-            <a:extLst>
-              <a:ext uri="{FF2B5EF4-FFF2-40B4-BE49-F238E27FC236}">
-                <a16:creationId xmlns:a16="http://schemas.microsoft.com/office/drawing/2014/main" id="{EE4F5A28-492B-40FE-814B-926C1F73ECC3}"/>
-              </a:ext>
-            </a:extLst>
-          </p:cNvPr>
-          <p:cNvSpPr>
-            <a:spLocks noGrp="1"/>
-          </p:cNvSpPr>
-          <p:nvPr>
-            <p:ph idx="1"/>
-          </p:nvPr>
-        </p:nvSpPr>
-        <p:spPr/>
-        <p:txBody>
-          <a:bodyPr>
-            <a:normAutofit/>
-          </a:bodyPr>
-          <a:lstStyle/>
-          <a:p>
-            <a:pPr marL="0" indent="0" algn="just" rtl="0">
-              <a:buNone/>
-            </a:pPr>
-            <a:r>
-              <a:rPr lang="en-US" sz="1000" b="0" dirty="0">
-                <a:cs typeface="+mj-cs"/>
-              </a:rPr>
-              <a:t>[1]</a:t>
-            </a:r>
-            <a:r>
-              <a:rPr lang="fa-IR" sz="1000" b="0" dirty="0">
-                <a:cs typeface="+mj-cs"/>
-              </a:rPr>
-              <a:t> </a:t>
-            </a:r>
-            <a:r>
-              <a:rPr lang="en-US" sz="1000" b="0" dirty="0">
-                <a:cs typeface="+mj-cs"/>
-              </a:rPr>
-              <a:t>M. </a:t>
-            </a:r>
-            <a:r>
-              <a:rPr lang="en-US" sz="1000" b="0" dirty="0" err="1">
-                <a:cs typeface="+mj-cs"/>
-              </a:rPr>
-              <a:t>Noferesti</a:t>
-            </a:r>
-            <a:r>
-              <a:rPr lang="en-US" sz="1000" b="0" dirty="0">
-                <a:cs typeface="+mj-cs"/>
-              </a:rPr>
-              <a:t> and R. Jalili, ‘ACoPE: An adaptive semi-supervised learning approach for complex-policy enforcement in high-bandwidth networks’, Computer Networks, vol. 166, p. 106943, Jan. 2020.</a:t>
-            </a:r>
-          </a:p>
-          <a:p>
-            <a:pPr marL="0" indent="0" algn="just" rtl="0">
-              <a:buNone/>
-            </a:pPr>
-            <a:r>
-              <a:rPr lang="en-US" sz="1000" b="0" dirty="0">
-                <a:cs typeface="+mj-cs"/>
-              </a:rPr>
-              <a:t>[2] R. K. Deka, D. K. Bhattacharyya, and J. K. </a:t>
-            </a:r>
-            <a:r>
-              <a:rPr lang="en-US" sz="1000" b="0" dirty="0" err="1">
-                <a:cs typeface="+mj-cs"/>
-              </a:rPr>
-              <a:t>Kalita</a:t>
-            </a:r>
-            <a:r>
-              <a:rPr lang="en-US" sz="1000" b="0" dirty="0">
-                <a:cs typeface="+mj-cs"/>
-              </a:rPr>
-              <a:t>, ‘Active learning to detect DDoS attack using ranked features’, Computer Communications, vol. 145, pp. 203–222, Sep. 2019.</a:t>
-            </a:r>
-          </a:p>
-          <a:p>
-            <a:pPr marL="0" indent="0" algn="just" rtl="0">
-              <a:buNone/>
-            </a:pPr>
-            <a:r>
-              <a:rPr lang="en-US" sz="1000" b="0" dirty="0">
-                <a:cs typeface="+mj-cs"/>
-              </a:rPr>
-              <a:t>[3</a:t>
-            </a:r>
-            <a:r>
-              <a:rPr lang="de-DE" sz="1000" b="0" dirty="0">
-                <a:cs typeface="+mj-cs"/>
-              </a:rPr>
-              <a:t>] </a:t>
-            </a:r>
-            <a:r>
-              <a:rPr lang="en-US" sz="1000" b="0" dirty="0">
-                <a:cs typeface="+mj-cs"/>
-              </a:rPr>
-              <a:t>H. Shi, G. Cheng, Y. Hu, F. Wang, and H. Ding, ‘RT-SAD: Real-Time Sketch-Based Adaptive DDoS Detection for ISP Network’, Security and Communication Networks, vol. 2021, pp. 1–10, Jul. 2021.</a:t>
-            </a:r>
-          </a:p>
-          <a:p>
-            <a:pPr marL="0" indent="0" algn="just" rtl="0">
-              <a:buNone/>
-            </a:pPr>
-            <a:r>
-              <a:rPr lang="en-US" sz="1000" b="0" dirty="0">
-                <a:cs typeface="+mj-cs"/>
-              </a:rPr>
-              <a:t>[4]</a:t>
-            </a:r>
-            <a:r>
-              <a:rPr lang="fa-IR" sz="1000" b="0" dirty="0">
-                <a:cs typeface="+mj-cs"/>
-              </a:rPr>
-              <a:t> </a:t>
-            </a:r>
-            <a:r>
-              <a:rPr lang="en-US" sz="1000" b="0" dirty="0">
-                <a:cs typeface="+mj-cs"/>
-              </a:rPr>
-              <a:t>R. Vishwakarma and A. K. Jain, ‘A survey of DDoS attacking techniques and </a:t>
-            </a:r>
-            <a:r>
-              <a:rPr lang="en-US" sz="1000" b="0" dirty="0" err="1">
-                <a:cs typeface="+mj-cs"/>
-              </a:rPr>
-              <a:t>defence</a:t>
-            </a:r>
-            <a:r>
-              <a:rPr lang="en-US" sz="1000" b="0" dirty="0">
-                <a:cs typeface="+mj-cs"/>
-              </a:rPr>
-              <a:t> mechanisms in the IoT network’, Tele-</a:t>
-            </a:r>
-            <a:r>
-              <a:rPr lang="en-US" sz="1000" b="0" dirty="0" err="1">
-                <a:cs typeface="+mj-cs"/>
-              </a:rPr>
-              <a:t>commun</a:t>
-            </a:r>
-            <a:r>
-              <a:rPr lang="en-US" sz="1000" b="0" dirty="0">
-                <a:cs typeface="+mj-cs"/>
-              </a:rPr>
-              <a:t> Syst, vol. 73, no. 1, pp. 3–25, Jan. 2020.</a:t>
-            </a:r>
-          </a:p>
-          <a:p>
-            <a:pPr marL="0" indent="0" algn="just" rtl="0">
-              <a:buNone/>
-            </a:pPr>
-            <a:r>
-              <a:rPr lang="en-US" sz="1000" b="0" dirty="0">
-                <a:cs typeface="+mj-cs"/>
-              </a:rPr>
-              <a:t>[5] ‘Cisco Annual Internet Report (2018–2023) White Paper’, Mar. 2020. [Online]. Available: https://www.a10networks.com/blog/5-most-famous-ddos-attacks/</a:t>
-            </a:r>
-          </a:p>
-          <a:p>
-            <a:pPr marL="0" indent="0" algn="just" rtl="0">
-              <a:buNone/>
-            </a:pPr>
-            <a:r>
-              <a:rPr lang="en-US" sz="1000" b="0" dirty="0">
-                <a:cs typeface="+mj-cs"/>
-              </a:rPr>
-              <a:t>[6] B. Zhao, X. Li, B. Tian, Z. Mei, and W. Wu, ‘DHS: Adaptive Memory Layout Organization of Sketch Slots for Fast and Ac-curate Data Stream Processing’, in Proceedings of the 27th ACM SIGKDD Conference on Knowledge Discovery &amp; Data Min-</a:t>
-            </a:r>
-            <a:r>
-              <a:rPr lang="en-US" sz="1000" b="0" dirty="0" err="1">
-                <a:cs typeface="+mj-cs"/>
-              </a:rPr>
-              <a:t>ing</a:t>
-            </a:r>
-            <a:r>
-              <a:rPr lang="en-US" sz="1000" b="0" dirty="0">
-                <a:cs typeface="+mj-cs"/>
-              </a:rPr>
-              <a:t>, Virtual Event Singapore, pp. 2285–2293, Aug. 2021.</a:t>
-            </a:r>
-          </a:p>
-          <a:p>
-            <a:pPr marL="0" indent="0" algn="just" rtl="0">
-              <a:buNone/>
-            </a:pPr>
-            <a:r>
-              <a:rPr lang="en-US" sz="1000" b="0" dirty="0">
-                <a:cs typeface="+mj-cs"/>
-              </a:rPr>
-              <a:t>[7] B. Krishnamurthy, S. Sen, Y. Zhang, and Y. Chen, ‘Sketch-based change detection: methods, evaluation, and applications’, in Proceedings of the 2003 ACM SIGCOMM conference on Internet measurement  - IMC ’03, Miami Beach, FL, USA, p. 234, 2003.</a:t>
-            </a:r>
-          </a:p>
-          <a:p>
-            <a:pPr marL="0" indent="0" algn="just" rtl="0">
-              <a:buNone/>
-            </a:pPr>
-            <a:r>
-              <a:rPr lang="en-US" sz="1000" b="0" dirty="0">
-                <a:cs typeface="+mj-cs"/>
-              </a:rPr>
-              <a:t>[8] Q. Xiao, Z. Tang, and S. Chen, ‘Universal Online Sketch for Tracking Heavy Hitters and Estimating Moments of Data Streams’, in IEEE INFOCOM 2020 - IEEE Conference on Computer Communications, Toronto, ON, Canada, pp. 974–983, Jul. 2020.</a:t>
-            </a:r>
-          </a:p>
-          <a:p>
-            <a:pPr marL="0" indent="0" algn="just" rtl="0">
-              <a:buNone/>
-            </a:pPr>
-            <a:r>
-              <a:rPr lang="en-US" sz="1000" b="0" dirty="0">
-                <a:cs typeface="+mj-cs"/>
-              </a:rPr>
-              <a:t>[9] V. </a:t>
-            </a:r>
-            <a:r>
-              <a:rPr lang="en-US" sz="1000" b="0" dirty="0" err="1">
-                <a:cs typeface="+mj-cs"/>
-              </a:rPr>
-              <a:t>Sivaraman</a:t>
-            </a:r>
-            <a:r>
-              <a:rPr lang="en-US" sz="1000" b="0" dirty="0">
-                <a:cs typeface="+mj-cs"/>
-              </a:rPr>
-              <a:t>, S. Narayana, O. </a:t>
-            </a:r>
-            <a:r>
-              <a:rPr lang="en-US" sz="1000" b="0" dirty="0" err="1">
-                <a:cs typeface="+mj-cs"/>
-              </a:rPr>
-              <a:t>Rottenstreich</a:t>
-            </a:r>
-            <a:r>
-              <a:rPr lang="en-US" sz="1000" b="0" dirty="0">
-                <a:cs typeface="+mj-cs"/>
-              </a:rPr>
-              <a:t>, S. </a:t>
-            </a:r>
-            <a:r>
-              <a:rPr lang="en-US" sz="1000" b="0" dirty="0" err="1">
-                <a:cs typeface="+mj-cs"/>
-              </a:rPr>
-              <a:t>Muthukrishnan</a:t>
-            </a:r>
-            <a:r>
-              <a:rPr lang="en-US" sz="1000" b="0" dirty="0">
-                <a:cs typeface="+mj-cs"/>
-              </a:rPr>
-              <a:t>, and J. Rexford, ‘Heavy-Hitter Detection Entirely in the Data Plane’, in Proceedings of the Symposium on SDN Research, Santa Clara CA USA, pp. 164–176, Apr. 2017.</a:t>
-            </a:r>
-          </a:p>
-          <a:p>
-            <a:pPr marL="0" indent="0" algn="just" rtl="0">
-              <a:buNone/>
-            </a:pPr>
-            <a:r>
-              <a:rPr lang="en-US" sz="1000" b="0" dirty="0">
-                <a:cs typeface="+mj-cs"/>
-              </a:rPr>
-              <a:t>[10] M. </a:t>
-            </a:r>
-            <a:r>
-              <a:rPr lang="en-US" sz="1000" b="0" dirty="0" err="1">
-                <a:cs typeface="+mj-cs"/>
-              </a:rPr>
-              <a:t>Charikar</a:t>
-            </a:r>
-            <a:r>
-              <a:rPr lang="en-US" sz="1000" b="0" dirty="0">
-                <a:cs typeface="+mj-cs"/>
-              </a:rPr>
-              <a:t>, K. Chen, and M. </a:t>
-            </a:r>
-            <a:r>
-              <a:rPr lang="en-US" sz="1000" b="0" dirty="0" err="1">
-                <a:cs typeface="+mj-cs"/>
-              </a:rPr>
-              <a:t>Farach</a:t>
-            </a:r>
-            <a:r>
-              <a:rPr lang="en-US" sz="1000" b="0" dirty="0">
-                <a:cs typeface="+mj-cs"/>
-              </a:rPr>
-              <a:t>-Colton, ‘Finding Frequent Items in Data Streams’, in Automata, Languages and Pro-</a:t>
-            </a:r>
-            <a:r>
-              <a:rPr lang="en-US" sz="1000" b="0" dirty="0" err="1">
-                <a:cs typeface="+mj-cs"/>
-              </a:rPr>
-              <a:t>gramming</a:t>
-            </a:r>
-            <a:r>
-              <a:rPr lang="en-US" sz="1000" b="0" dirty="0">
-                <a:cs typeface="+mj-cs"/>
-              </a:rPr>
-              <a:t>, vol. 2380, P. </a:t>
-            </a:r>
-            <a:r>
-              <a:rPr lang="en-US" sz="1000" b="0" dirty="0" err="1">
-                <a:cs typeface="+mj-cs"/>
-              </a:rPr>
-              <a:t>Widmayer</a:t>
-            </a:r>
-            <a:r>
-              <a:rPr lang="en-US" sz="1000" b="0" dirty="0">
-                <a:cs typeface="+mj-cs"/>
-              </a:rPr>
-              <a:t>, S. </a:t>
-            </a:r>
-            <a:r>
-              <a:rPr lang="en-US" sz="1000" b="0" dirty="0" err="1">
-                <a:cs typeface="+mj-cs"/>
-              </a:rPr>
-              <a:t>Eidenbenz</a:t>
-            </a:r>
-            <a:r>
-              <a:rPr lang="en-US" sz="1000" b="0" dirty="0">
-                <a:cs typeface="+mj-cs"/>
-              </a:rPr>
-              <a:t>, F. </a:t>
-            </a:r>
-            <a:r>
-              <a:rPr lang="en-US" sz="1000" b="0" dirty="0" err="1">
-                <a:cs typeface="+mj-cs"/>
-              </a:rPr>
-              <a:t>Triguero</a:t>
-            </a:r>
-            <a:r>
-              <a:rPr lang="en-US" sz="1000" b="0" dirty="0">
-                <a:cs typeface="+mj-cs"/>
-              </a:rPr>
-              <a:t>, R. Morales, R. </a:t>
-            </a:r>
-            <a:r>
-              <a:rPr lang="en-US" sz="1000" b="0" dirty="0" err="1">
-                <a:cs typeface="+mj-cs"/>
-              </a:rPr>
-              <a:t>Conejo</a:t>
-            </a:r>
-            <a:r>
-              <a:rPr lang="en-US" sz="1000" b="0" dirty="0">
-                <a:cs typeface="+mj-cs"/>
-              </a:rPr>
-              <a:t>, and M. Hennessy, Eds. Berlin, </a:t>
-            </a:r>
-            <a:r>
-              <a:rPr lang="en-US" sz="1000" b="0" dirty="0" err="1">
-                <a:cs typeface="+mj-cs"/>
-              </a:rPr>
-              <a:t>Hei-delberg</a:t>
-            </a:r>
-            <a:r>
-              <a:rPr lang="en-US" sz="1000" b="0" dirty="0">
-                <a:cs typeface="+mj-cs"/>
-              </a:rPr>
-              <a:t>: Springer Berlin Heidelberg, pp. 693–703, 2002.</a:t>
-            </a:r>
-          </a:p>
-          <a:p>
-            <a:pPr marL="0" indent="0" algn="just" rtl="0">
-              <a:buNone/>
-            </a:pPr>
-            <a:r>
-              <a:rPr lang="en-US" sz="1000" b="0" dirty="0">
-                <a:cs typeface="+mj-cs"/>
-              </a:rPr>
-              <a:t>[11] S. </a:t>
-            </a:r>
-            <a:r>
-              <a:rPr lang="en-US" sz="1000" b="0" dirty="0" err="1">
-                <a:cs typeface="+mj-cs"/>
-              </a:rPr>
-              <a:t>Muthukrishnan</a:t>
-            </a:r>
-            <a:r>
-              <a:rPr lang="en-US" sz="1000" b="0" dirty="0">
-                <a:cs typeface="+mj-cs"/>
-              </a:rPr>
-              <a:t>, ‘Data Streams: Algorithms and Applications’, FNT in Theoretical Computer Science, vol. 1, no. 2, pp. 117–236, 2005.</a:t>
-            </a:r>
-          </a:p>
-          <a:p>
-            <a:pPr marL="0" indent="0" algn="just" rtl="0">
-              <a:buNone/>
-            </a:pPr>
-            <a:r>
-              <a:rPr lang="en-US" sz="1000" b="0" dirty="0">
-                <a:cs typeface="+mj-cs"/>
-              </a:rPr>
-              <a:t>[12] G. </a:t>
-            </a:r>
-            <a:r>
-              <a:rPr lang="en-US" sz="1000" b="0" dirty="0" err="1">
-                <a:cs typeface="+mj-cs"/>
-              </a:rPr>
-              <a:t>Cormode</a:t>
-            </a:r>
-            <a:r>
-              <a:rPr lang="en-US" sz="1000" b="0" dirty="0">
-                <a:cs typeface="+mj-cs"/>
-              </a:rPr>
-              <a:t> and S. </a:t>
-            </a:r>
-            <a:r>
-              <a:rPr lang="en-US" sz="1000" b="0" dirty="0" err="1">
-                <a:cs typeface="+mj-cs"/>
-              </a:rPr>
-              <a:t>Muthukrishnan</a:t>
-            </a:r>
-            <a:r>
-              <a:rPr lang="en-US" sz="1000" b="0" dirty="0">
-                <a:cs typeface="+mj-cs"/>
-              </a:rPr>
-              <a:t>, ‘An improved data stream summary: the count-min sketch and its applications’, Journal of Algorithms, vol. 55, no. 1, pp. 58–75, Apr. 2005.</a:t>
-            </a:r>
-          </a:p>
-          <a:p>
-            <a:pPr marL="0" indent="0" algn="just" rtl="0">
-              <a:buNone/>
-            </a:pPr>
-            <a:r>
-              <a:rPr lang="en-US" sz="1000" b="0" dirty="0">
-                <a:cs typeface="+mj-cs"/>
-              </a:rPr>
-              <a:t>[13] Z. Liu, A. </a:t>
-            </a:r>
-            <a:r>
-              <a:rPr lang="en-US" sz="1000" b="0" dirty="0" err="1">
-                <a:cs typeface="+mj-cs"/>
-              </a:rPr>
-              <a:t>Manousis</a:t>
-            </a:r>
-            <a:r>
-              <a:rPr lang="en-US" sz="1000" b="0" dirty="0">
-                <a:cs typeface="+mj-cs"/>
-              </a:rPr>
-              <a:t>, G. </a:t>
-            </a:r>
-            <a:r>
-              <a:rPr lang="en-US" sz="1000" b="0" dirty="0" err="1">
-                <a:cs typeface="+mj-cs"/>
-              </a:rPr>
-              <a:t>Vorsanger</a:t>
-            </a:r>
-            <a:r>
-              <a:rPr lang="en-US" sz="1000" b="0" dirty="0">
-                <a:cs typeface="+mj-cs"/>
-              </a:rPr>
-              <a:t>, V. </a:t>
-            </a:r>
-            <a:r>
-              <a:rPr lang="en-US" sz="1000" b="0" dirty="0" err="1">
-                <a:cs typeface="+mj-cs"/>
-              </a:rPr>
-              <a:t>Sekar</a:t>
-            </a:r>
-            <a:r>
-              <a:rPr lang="en-US" sz="1000" b="0" dirty="0">
-                <a:cs typeface="+mj-cs"/>
-              </a:rPr>
-              <a:t>, and V. Braverman, ‘One Sketch to Rule Them All: Rethinking Network Flow Monitoring with </a:t>
-            </a:r>
-            <a:r>
-              <a:rPr lang="en-US" sz="1000" b="0" dirty="0" err="1">
-                <a:cs typeface="+mj-cs"/>
-              </a:rPr>
-              <a:t>UnivMon</a:t>
-            </a:r>
-            <a:r>
-              <a:rPr lang="en-US" sz="1000" b="0" dirty="0">
-                <a:cs typeface="+mj-cs"/>
-              </a:rPr>
-              <a:t>’, in Proceedings of the 2016 ACM SIGCOMM Conference, Florianopolis Brazil, pp. 101–114, Aug. 2016.</a:t>
-            </a:r>
-          </a:p>
-          <a:p>
-            <a:pPr marL="0" indent="0" algn="just" rtl="0">
-              <a:buNone/>
-            </a:pPr>
-            <a:endParaRPr lang="en-US" sz="1000" dirty="0">
-              <a:cs typeface="+mj-cs"/>
-            </a:endParaRPr>
-          </a:p>
-          <a:p>
-            <a:pPr algn="just" rtl="0"/>
-            <a:endParaRPr lang="en-US" sz="1000" dirty="0">
-              <a:cs typeface="+mj-cs"/>
-            </a:endParaRPr>
-          </a:p>
-        </p:txBody>
-      </p:sp>
-      <p:sp>
-        <p:nvSpPr>
-          <p:cNvPr id="5" name="Text Placeholder 4">
-            <a:extLst>
-              <a:ext uri="{FF2B5EF4-FFF2-40B4-BE49-F238E27FC236}">
-                <a16:creationId xmlns:a16="http://schemas.microsoft.com/office/drawing/2014/main" id="{4A71148D-E8B6-4CA4-8C41-9791F9F700EB}"/>
-              </a:ext>
-            </a:extLst>
-          </p:cNvPr>
-          <p:cNvSpPr>
-            <a:spLocks noGrp="1"/>
-          </p:cNvSpPr>
-          <p:nvPr>
-            <p:ph type="body" sz="quarter" idx="10"/>
-          </p:nvPr>
-        </p:nvSpPr>
-        <p:spPr/>
-        <p:txBody>
-          <a:bodyPr/>
-          <a:lstStyle/>
-          <a:p>
-            <a:r>
-              <a:rPr lang="fa-IR" dirty="0"/>
-              <a:t>مراجع</a:t>
-            </a:r>
-            <a:endParaRPr lang="en-US" dirty="0"/>
-          </a:p>
-        </p:txBody>
-      </p:sp>
-    </p:spTree>
-    <p:extLst>
-      <p:ext uri="{BB962C8B-B14F-4D97-AF65-F5344CB8AC3E}">
-        <p14:creationId xmlns:p14="http://schemas.microsoft.com/office/powerpoint/2010/main" val="2969456679"/>
-      </p:ext>
-    </p:extLst>
-  </p:cSld>
-  <p:clrMapOvr>
-    <a:masterClrMapping/>
-  </p:clrMapOvr>
-</p:sld>
-</file>
-
 <file path=ppt/slides/slide23.xml><?xml version="1.0" encoding="utf-8"?>
 <p:sld xmlns:a="http://schemas.openxmlformats.org/drawingml/2006/main" xmlns:r="http://schemas.openxmlformats.org/officeDocument/2006/relationships" xmlns:p="http://schemas.openxmlformats.org/presentationml/2006/main">
   <p:cSld>
@@ -14714,6 +14302,558 @@
             </a:pPr>
             <a:r>
               <a:rPr lang="en-US" sz="1000" b="0" dirty="0">
+                <a:cs typeface="+mj-cs"/>
+              </a:rPr>
+              <a:t>[1]</a:t>
+            </a:r>
+            <a:r>
+              <a:rPr lang="fa-IR" sz="1000" b="0" dirty="0">
+                <a:cs typeface="+mj-cs"/>
+              </a:rPr>
+              <a:t> </a:t>
+            </a:r>
+            <a:r>
+              <a:rPr lang="en-US" sz="1000" b="0" dirty="0">
+                <a:cs typeface="+mj-cs"/>
+              </a:rPr>
+              <a:t>M. </a:t>
+            </a:r>
+            <a:r>
+              <a:rPr lang="en-US" sz="1000" b="0" dirty="0" err="1">
+                <a:cs typeface="+mj-cs"/>
+              </a:rPr>
+              <a:t>Noferesti</a:t>
+            </a:r>
+            <a:r>
+              <a:rPr lang="en-US" sz="1000" b="0" dirty="0">
+                <a:cs typeface="+mj-cs"/>
+              </a:rPr>
+              <a:t> and R. Jalili, ‘ACoPE: An adaptive semi-supervised learning approach for complex-policy enforcement in high-bandwidth networks’, Computer Networks, vol. 166, p. 106943, Jan. 2020.</a:t>
+            </a:r>
+          </a:p>
+          <a:p>
+            <a:pPr marL="0" indent="0" algn="just" rtl="0">
+              <a:buNone/>
+            </a:pPr>
+            <a:r>
+              <a:rPr lang="en-US" sz="1000" b="0" dirty="0">
+                <a:cs typeface="+mj-cs"/>
+              </a:rPr>
+              <a:t>[2] R. K. Deka, D. K. Bhattacharyya, and J. K. </a:t>
+            </a:r>
+            <a:r>
+              <a:rPr lang="en-US" sz="1000" b="0" dirty="0" err="1">
+                <a:cs typeface="+mj-cs"/>
+              </a:rPr>
+              <a:t>Kalita</a:t>
+            </a:r>
+            <a:r>
+              <a:rPr lang="en-US" sz="1000" b="0" dirty="0">
+                <a:cs typeface="+mj-cs"/>
+              </a:rPr>
+              <a:t>, ‘Active learning to detect DDoS attack using ranked features’, Computer Communications, vol. 145, pp. 203–222, Sep. 2019.</a:t>
+            </a:r>
+          </a:p>
+          <a:p>
+            <a:pPr marL="0" indent="0" algn="just" rtl="0">
+              <a:buNone/>
+            </a:pPr>
+            <a:r>
+              <a:rPr lang="en-US" sz="1000" b="0" dirty="0">
+                <a:cs typeface="+mj-cs"/>
+              </a:rPr>
+              <a:t>[3</a:t>
+            </a:r>
+            <a:r>
+              <a:rPr lang="de-DE" sz="1000" b="0" dirty="0">
+                <a:cs typeface="+mj-cs"/>
+              </a:rPr>
+              <a:t>] </a:t>
+            </a:r>
+            <a:r>
+              <a:rPr lang="en-US" sz="1000" b="0" dirty="0">
+                <a:cs typeface="+mj-cs"/>
+              </a:rPr>
+              <a:t>H. Shi, G. Cheng, Y. Hu, F. Wang, and H. Ding, ‘RT-SAD: Real-Time Sketch-Based Adaptive DDoS Detection for ISP Network’, Security and Communication Networks, vol. 2021, pp. 1–10, Jul. 2021.</a:t>
+            </a:r>
+          </a:p>
+          <a:p>
+            <a:pPr marL="0" indent="0" algn="just" rtl="0">
+              <a:buNone/>
+            </a:pPr>
+            <a:r>
+              <a:rPr lang="en-US" sz="1000" b="0" dirty="0">
+                <a:cs typeface="+mj-cs"/>
+              </a:rPr>
+              <a:t>[4]</a:t>
+            </a:r>
+            <a:r>
+              <a:rPr lang="fa-IR" sz="1000" b="0" dirty="0">
+                <a:cs typeface="+mj-cs"/>
+              </a:rPr>
+              <a:t> </a:t>
+            </a:r>
+            <a:r>
+              <a:rPr lang="en-US" sz="1000" b="0" dirty="0">
+                <a:cs typeface="+mj-cs"/>
+              </a:rPr>
+              <a:t>R. Vishwakarma and A. K. Jain, ‘A survey of DDoS attacking techniques and </a:t>
+            </a:r>
+            <a:r>
+              <a:rPr lang="en-US" sz="1000" b="0" dirty="0" err="1">
+                <a:cs typeface="+mj-cs"/>
+              </a:rPr>
+              <a:t>defence</a:t>
+            </a:r>
+            <a:r>
+              <a:rPr lang="en-US" sz="1000" b="0" dirty="0">
+                <a:cs typeface="+mj-cs"/>
+              </a:rPr>
+              <a:t> mechanisms in the IoT network’, Tele-</a:t>
+            </a:r>
+            <a:r>
+              <a:rPr lang="en-US" sz="1000" b="0" dirty="0" err="1">
+                <a:cs typeface="+mj-cs"/>
+              </a:rPr>
+              <a:t>commun</a:t>
+            </a:r>
+            <a:r>
+              <a:rPr lang="en-US" sz="1000" b="0" dirty="0">
+                <a:cs typeface="+mj-cs"/>
+              </a:rPr>
+              <a:t> Syst, vol. 73, no. 1, pp. 3–25, Jan. 2020.</a:t>
+            </a:r>
+          </a:p>
+          <a:p>
+            <a:pPr marL="0" indent="0" algn="just" rtl="0">
+              <a:buNone/>
+            </a:pPr>
+            <a:r>
+              <a:rPr lang="en-US" sz="1000" b="0" dirty="0">
+                <a:cs typeface="+mj-cs"/>
+              </a:rPr>
+              <a:t>[5] ‘Cisco Annual Internet Report (2018–2023) White Paper’, Mar. 2020. [Online]. Available: https://www.a10networks.com/blog/5-most-famous-ddos-attacks/</a:t>
+            </a:r>
+          </a:p>
+          <a:p>
+            <a:pPr marL="0" indent="0" algn="just" rtl="0">
+              <a:buNone/>
+            </a:pPr>
+            <a:r>
+              <a:rPr lang="en-US" sz="1000" b="0" dirty="0">
+                <a:cs typeface="+mj-cs"/>
+              </a:rPr>
+              <a:t>[6] B. Zhao, X. Li, B. Tian, Z. Mei, and W. Wu, ‘DHS: Adaptive Memory Layout Organization of Sketch Slots for Fast and Ac-curate Data Stream Processing’, in Proceedings of the 27th ACM SIGKDD Conference on Knowledge Discovery &amp; Data Min-</a:t>
+            </a:r>
+            <a:r>
+              <a:rPr lang="en-US" sz="1000" b="0" dirty="0" err="1">
+                <a:cs typeface="+mj-cs"/>
+              </a:rPr>
+              <a:t>ing</a:t>
+            </a:r>
+            <a:r>
+              <a:rPr lang="en-US" sz="1000" b="0" dirty="0">
+                <a:cs typeface="+mj-cs"/>
+              </a:rPr>
+              <a:t>, Virtual Event Singapore, pp. 2285–2293, Aug. 2021.</a:t>
+            </a:r>
+          </a:p>
+          <a:p>
+            <a:pPr marL="0" indent="0" algn="just" rtl="0">
+              <a:buNone/>
+            </a:pPr>
+            <a:r>
+              <a:rPr lang="en-US" sz="1000" b="0" dirty="0">
+                <a:cs typeface="+mj-cs"/>
+              </a:rPr>
+              <a:t>[7] B. Krishnamurthy, S. Sen, Y. Zhang, and Y. Chen, ‘Sketch-based change detection: methods, evaluation, and applications’, in Proceedings of the 2003 ACM SIGCOMM conference on Internet measurement  - IMC ’03, Miami Beach, FL, USA, p. 234, 2003.</a:t>
+            </a:r>
+          </a:p>
+          <a:p>
+            <a:pPr marL="0" indent="0" algn="just" rtl="0">
+              <a:buNone/>
+            </a:pPr>
+            <a:r>
+              <a:rPr lang="en-US" sz="1000" b="0" dirty="0">
+                <a:cs typeface="+mj-cs"/>
+              </a:rPr>
+              <a:t>[8] Q. Xiao, Z. Tang, and S. Chen, ‘Universal Online Sketch for Tracking Heavy Hitters and Estimating Moments of Data Streams’, in IEEE INFOCOM 2020 - IEEE Conference on Computer Communications, Toronto, ON, Canada, pp. 974–983, Jul. 2020.</a:t>
+            </a:r>
+          </a:p>
+          <a:p>
+            <a:pPr marL="0" indent="0" algn="just" rtl="0">
+              <a:buNone/>
+            </a:pPr>
+            <a:r>
+              <a:rPr lang="en-US" sz="1000" b="0" dirty="0">
+                <a:cs typeface="+mj-cs"/>
+              </a:rPr>
+              <a:t>[9] V. </a:t>
+            </a:r>
+            <a:r>
+              <a:rPr lang="en-US" sz="1000" b="0" dirty="0" err="1">
+                <a:cs typeface="+mj-cs"/>
+              </a:rPr>
+              <a:t>Sivaraman</a:t>
+            </a:r>
+            <a:r>
+              <a:rPr lang="en-US" sz="1000" b="0" dirty="0">
+                <a:cs typeface="+mj-cs"/>
+              </a:rPr>
+              <a:t>, S. Narayana, O. </a:t>
+            </a:r>
+            <a:r>
+              <a:rPr lang="en-US" sz="1000" b="0" dirty="0" err="1">
+                <a:cs typeface="+mj-cs"/>
+              </a:rPr>
+              <a:t>Rottenstreich</a:t>
+            </a:r>
+            <a:r>
+              <a:rPr lang="en-US" sz="1000" b="0" dirty="0">
+                <a:cs typeface="+mj-cs"/>
+              </a:rPr>
+              <a:t>, S. </a:t>
+            </a:r>
+            <a:r>
+              <a:rPr lang="en-US" sz="1000" b="0" dirty="0" err="1">
+                <a:cs typeface="+mj-cs"/>
+              </a:rPr>
+              <a:t>Muthukrishnan</a:t>
+            </a:r>
+            <a:r>
+              <a:rPr lang="en-US" sz="1000" b="0" dirty="0">
+                <a:cs typeface="+mj-cs"/>
+              </a:rPr>
+              <a:t>, and J. Rexford, ‘Heavy-Hitter Detection Entirely in the Data Plane’, in Proceedings of the Symposium on SDN Research, Santa Clara CA USA, pp. 164–176, Apr. 2017.</a:t>
+            </a:r>
+          </a:p>
+          <a:p>
+            <a:pPr marL="0" indent="0" algn="just" rtl="0">
+              <a:buNone/>
+            </a:pPr>
+            <a:r>
+              <a:rPr lang="en-US" sz="1000" b="0" dirty="0">
+                <a:cs typeface="+mj-cs"/>
+              </a:rPr>
+              <a:t>[10] M. </a:t>
+            </a:r>
+            <a:r>
+              <a:rPr lang="en-US" sz="1000" b="0" dirty="0" err="1">
+                <a:cs typeface="+mj-cs"/>
+              </a:rPr>
+              <a:t>Charikar</a:t>
+            </a:r>
+            <a:r>
+              <a:rPr lang="en-US" sz="1000" b="0" dirty="0">
+                <a:cs typeface="+mj-cs"/>
+              </a:rPr>
+              <a:t>, K. Chen, and M. </a:t>
+            </a:r>
+            <a:r>
+              <a:rPr lang="en-US" sz="1000" b="0" dirty="0" err="1">
+                <a:cs typeface="+mj-cs"/>
+              </a:rPr>
+              <a:t>Farach</a:t>
+            </a:r>
+            <a:r>
+              <a:rPr lang="en-US" sz="1000" b="0" dirty="0">
+                <a:cs typeface="+mj-cs"/>
+              </a:rPr>
+              <a:t>-Colton, ‘Finding Frequent Items in Data Streams’, in Automata, Languages and Pro-</a:t>
+            </a:r>
+            <a:r>
+              <a:rPr lang="en-US" sz="1000" b="0" dirty="0" err="1">
+                <a:cs typeface="+mj-cs"/>
+              </a:rPr>
+              <a:t>gramming</a:t>
+            </a:r>
+            <a:r>
+              <a:rPr lang="en-US" sz="1000" b="0" dirty="0">
+                <a:cs typeface="+mj-cs"/>
+              </a:rPr>
+              <a:t>, vol. 2380, P. </a:t>
+            </a:r>
+            <a:r>
+              <a:rPr lang="en-US" sz="1000" b="0" dirty="0" err="1">
+                <a:cs typeface="+mj-cs"/>
+              </a:rPr>
+              <a:t>Widmayer</a:t>
+            </a:r>
+            <a:r>
+              <a:rPr lang="en-US" sz="1000" b="0" dirty="0">
+                <a:cs typeface="+mj-cs"/>
+              </a:rPr>
+              <a:t>, S. </a:t>
+            </a:r>
+            <a:r>
+              <a:rPr lang="en-US" sz="1000" b="0" dirty="0" err="1">
+                <a:cs typeface="+mj-cs"/>
+              </a:rPr>
+              <a:t>Eidenbenz</a:t>
+            </a:r>
+            <a:r>
+              <a:rPr lang="en-US" sz="1000" b="0" dirty="0">
+                <a:cs typeface="+mj-cs"/>
+              </a:rPr>
+              <a:t>, F. </a:t>
+            </a:r>
+            <a:r>
+              <a:rPr lang="en-US" sz="1000" b="0" dirty="0" err="1">
+                <a:cs typeface="+mj-cs"/>
+              </a:rPr>
+              <a:t>Triguero</a:t>
+            </a:r>
+            <a:r>
+              <a:rPr lang="en-US" sz="1000" b="0" dirty="0">
+                <a:cs typeface="+mj-cs"/>
+              </a:rPr>
+              <a:t>, R. Morales, R. </a:t>
+            </a:r>
+            <a:r>
+              <a:rPr lang="en-US" sz="1000" b="0" dirty="0" err="1">
+                <a:cs typeface="+mj-cs"/>
+              </a:rPr>
+              <a:t>Conejo</a:t>
+            </a:r>
+            <a:r>
+              <a:rPr lang="en-US" sz="1000" b="0" dirty="0">
+                <a:cs typeface="+mj-cs"/>
+              </a:rPr>
+              <a:t>, and M. Hennessy, Eds. Berlin, </a:t>
+            </a:r>
+            <a:r>
+              <a:rPr lang="en-US" sz="1000" b="0" dirty="0" err="1">
+                <a:cs typeface="+mj-cs"/>
+              </a:rPr>
+              <a:t>Hei-delberg</a:t>
+            </a:r>
+            <a:r>
+              <a:rPr lang="en-US" sz="1000" b="0" dirty="0">
+                <a:cs typeface="+mj-cs"/>
+              </a:rPr>
+              <a:t>: Springer Berlin Heidelberg, pp. 693–703, 2002.</a:t>
+            </a:r>
+          </a:p>
+          <a:p>
+            <a:pPr marL="0" indent="0" algn="just" rtl="0">
+              <a:buNone/>
+            </a:pPr>
+            <a:r>
+              <a:rPr lang="en-US" sz="1000" b="0" dirty="0">
+                <a:cs typeface="+mj-cs"/>
+              </a:rPr>
+              <a:t>[11] S. </a:t>
+            </a:r>
+            <a:r>
+              <a:rPr lang="en-US" sz="1000" b="0" dirty="0" err="1">
+                <a:cs typeface="+mj-cs"/>
+              </a:rPr>
+              <a:t>Muthukrishnan</a:t>
+            </a:r>
+            <a:r>
+              <a:rPr lang="en-US" sz="1000" b="0" dirty="0">
+                <a:cs typeface="+mj-cs"/>
+              </a:rPr>
+              <a:t>, ‘Data Streams: Algorithms and Applications’, FNT in Theoretical Computer Science, vol. 1, no. 2, pp. 117–236, 2005.</a:t>
+            </a:r>
+          </a:p>
+          <a:p>
+            <a:pPr marL="0" indent="0" algn="just" rtl="0">
+              <a:buNone/>
+            </a:pPr>
+            <a:r>
+              <a:rPr lang="en-US" sz="1000" b="0" dirty="0">
+                <a:cs typeface="+mj-cs"/>
+              </a:rPr>
+              <a:t>[12] G. </a:t>
+            </a:r>
+            <a:r>
+              <a:rPr lang="en-US" sz="1000" b="0" dirty="0" err="1">
+                <a:cs typeface="+mj-cs"/>
+              </a:rPr>
+              <a:t>Cormode</a:t>
+            </a:r>
+            <a:r>
+              <a:rPr lang="en-US" sz="1000" b="0" dirty="0">
+                <a:cs typeface="+mj-cs"/>
+              </a:rPr>
+              <a:t> and S. </a:t>
+            </a:r>
+            <a:r>
+              <a:rPr lang="en-US" sz="1000" b="0" dirty="0" err="1">
+                <a:cs typeface="+mj-cs"/>
+              </a:rPr>
+              <a:t>Muthukrishnan</a:t>
+            </a:r>
+            <a:r>
+              <a:rPr lang="en-US" sz="1000" b="0" dirty="0">
+                <a:cs typeface="+mj-cs"/>
+              </a:rPr>
+              <a:t>, ‘An improved data stream summary: the count-min sketch and its applications’, Journal of Algorithms, vol. 55, no. 1, pp. 58–75, Apr. 2005.</a:t>
+            </a:r>
+          </a:p>
+          <a:p>
+            <a:pPr marL="0" indent="0" algn="just" rtl="0">
+              <a:buNone/>
+            </a:pPr>
+            <a:r>
+              <a:rPr lang="en-US" sz="1000" b="0" dirty="0">
+                <a:cs typeface="+mj-cs"/>
+              </a:rPr>
+              <a:t>[13] Z. Liu, A. </a:t>
+            </a:r>
+            <a:r>
+              <a:rPr lang="en-US" sz="1000" b="0" dirty="0" err="1">
+                <a:cs typeface="+mj-cs"/>
+              </a:rPr>
+              <a:t>Manousis</a:t>
+            </a:r>
+            <a:r>
+              <a:rPr lang="en-US" sz="1000" b="0" dirty="0">
+                <a:cs typeface="+mj-cs"/>
+              </a:rPr>
+              <a:t>, G. </a:t>
+            </a:r>
+            <a:r>
+              <a:rPr lang="en-US" sz="1000" b="0" dirty="0" err="1">
+                <a:cs typeface="+mj-cs"/>
+              </a:rPr>
+              <a:t>Vorsanger</a:t>
+            </a:r>
+            <a:r>
+              <a:rPr lang="en-US" sz="1000" b="0" dirty="0">
+                <a:cs typeface="+mj-cs"/>
+              </a:rPr>
+              <a:t>, V. </a:t>
+            </a:r>
+            <a:r>
+              <a:rPr lang="en-US" sz="1000" b="0" dirty="0" err="1">
+                <a:cs typeface="+mj-cs"/>
+              </a:rPr>
+              <a:t>Sekar</a:t>
+            </a:r>
+            <a:r>
+              <a:rPr lang="en-US" sz="1000" b="0" dirty="0">
+                <a:cs typeface="+mj-cs"/>
+              </a:rPr>
+              <a:t>, and V. Braverman, ‘One Sketch to Rule Them All: Rethinking Network Flow Monitoring with </a:t>
+            </a:r>
+            <a:r>
+              <a:rPr lang="en-US" sz="1000" b="0" dirty="0" err="1">
+                <a:cs typeface="+mj-cs"/>
+              </a:rPr>
+              <a:t>UnivMon</a:t>
+            </a:r>
+            <a:r>
+              <a:rPr lang="en-US" sz="1000" b="0" dirty="0">
+                <a:cs typeface="+mj-cs"/>
+              </a:rPr>
+              <a:t>’, in Proceedings of the 2016 ACM SIGCOMM Conference, Florianopolis Brazil, pp. 101–114, Aug. 2016.</a:t>
+            </a:r>
+          </a:p>
+          <a:p>
+            <a:pPr marL="0" indent="0" algn="just" rtl="0">
+              <a:buNone/>
+            </a:pPr>
+            <a:endParaRPr lang="en-US" sz="1000" dirty="0">
+              <a:cs typeface="+mj-cs"/>
+            </a:endParaRPr>
+          </a:p>
+          <a:p>
+            <a:pPr algn="just" rtl="0"/>
+            <a:endParaRPr lang="en-US" sz="1000" dirty="0">
+              <a:cs typeface="+mj-cs"/>
+            </a:endParaRPr>
+          </a:p>
+        </p:txBody>
+      </p:sp>
+      <p:sp>
+        <p:nvSpPr>
+          <p:cNvPr id="5" name="Text Placeholder 4">
+            <a:extLst>
+              <a:ext uri="{FF2B5EF4-FFF2-40B4-BE49-F238E27FC236}">
+                <a16:creationId xmlns:a16="http://schemas.microsoft.com/office/drawing/2014/main" id="{4A71148D-E8B6-4CA4-8C41-9791F9F700EB}"/>
+              </a:ext>
+            </a:extLst>
+          </p:cNvPr>
+          <p:cNvSpPr>
+            <a:spLocks noGrp="1"/>
+          </p:cNvSpPr>
+          <p:nvPr>
+            <p:ph type="body" sz="quarter" idx="10"/>
+          </p:nvPr>
+        </p:nvSpPr>
+        <p:spPr/>
+        <p:txBody>
+          <a:bodyPr/>
+          <a:lstStyle/>
+          <a:p>
+            <a:r>
+              <a:rPr lang="fa-IR" dirty="0"/>
+              <a:t>مراجع</a:t>
+            </a:r>
+            <a:endParaRPr lang="en-US" dirty="0"/>
+          </a:p>
+        </p:txBody>
+      </p:sp>
+    </p:spTree>
+    <p:extLst>
+      <p:ext uri="{BB962C8B-B14F-4D97-AF65-F5344CB8AC3E}">
+        <p14:creationId xmlns:p14="http://schemas.microsoft.com/office/powerpoint/2010/main" val="2969456679"/>
+      </p:ext>
+    </p:extLst>
+  </p:cSld>
+  <p:clrMapOvr>
+    <a:masterClrMapping/>
+  </p:clrMapOvr>
+</p:sld>
+</file>
+
+<file path=ppt/slides/slide24.xml><?xml version="1.0" encoding="utf-8"?>
+<p:sld xmlns:a="http://schemas.openxmlformats.org/drawingml/2006/main" xmlns:r="http://schemas.openxmlformats.org/officeDocument/2006/relationships" xmlns:p="http://schemas.openxmlformats.org/presentationml/2006/main">
+  <p:cSld>
+    <p:spTree>
+      <p:nvGrpSpPr>
+        <p:cNvPr id="1" name=""/>
+        <p:cNvGrpSpPr/>
+        <p:nvPr/>
+      </p:nvGrpSpPr>
+      <p:grpSpPr>
+        <a:xfrm>
+          <a:off x="0" y="0"/>
+          <a:ext cx="0" cy="0"/>
+          <a:chOff x="0" y="0"/>
+          <a:chExt cx="0" cy="0"/>
+        </a:xfrm>
+      </p:grpSpPr>
+      <p:sp>
+        <p:nvSpPr>
+          <p:cNvPr id="4" name="Content Placeholder 3">
+            <a:extLst>
+              <a:ext uri="{FF2B5EF4-FFF2-40B4-BE49-F238E27FC236}">
+                <a16:creationId xmlns:a16="http://schemas.microsoft.com/office/drawing/2014/main" id="{EE4F5A28-492B-40FE-814B-926C1F73ECC3}"/>
+              </a:ext>
+            </a:extLst>
+          </p:cNvPr>
+          <p:cNvSpPr>
+            <a:spLocks noGrp="1"/>
+          </p:cNvSpPr>
+          <p:nvPr>
+            <p:ph idx="1"/>
+          </p:nvPr>
+        </p:nvSpPr>
+        <p:spPr/>
+        <p:txBody>
+          <a:bodyPr>
+            <a:normAutofit/>
+          </a:bodyPr>
+          <a:lstStyle/>
+          <a:p>
+            <a:pPr marL="0" indent="0" algn="just" rtl="0">
+              <a:buNone/>
+            </a:pPr>
+            <a:r>
+              <a:rPr lang="en-US" sz="1000" b="0" dirty="0">
                 <a:latin typeface="Times New Roman" panose="02020603050405020304" pitchFamily="18" charset="0"/>
                 <a:cs typeface="Times New Roman" panose="02020603050405020304" pitchFamily="18" charset="0"/>
               </a:rPr>
@@ -15077,7 +15217,7 @@
 </p:sld>
 </file>
 
-<file path=ppt/slides/slide24.xml><?xml version="1.0" encoding="utf-8"?>
+<file path=ppt/slides/slide25.xml><?xml version="1.0" encoding="utf-8"?>
 <p:sld xmlns:a="http://schemas.openxmlformats.org/drawingml/2006/main" xmlns:r="http://schemas.openxmlformats.org/officeDocument/2006/relationships" xmlns:p="http://schemas.openxmlformats.org/presentationml/2006/main">
   <p:cSld>
     <p:spTree>
@@ -15311,7 +15451,7 @@
             </a:pPr>
             <a:r>
               <a:rPr lang="fa-IR" dirty="0"/>
-              <a:t>سرعت و نرخ بالای تولید اطلاعات</a:t>
+              <a:t>سرعت و نرخ بالای تبادل اطلاعات</a:t>
             </a:r>
           </a:p>
           <a:p>
@@ -15574,10 +15714,10 @@
       </p:grpSpPr>
       <p:sp>
         <p:nvSpPr>
-          <p:cNvPr id="4" name="Content Placeholder 3">
-            <a:extLst>
-              <a:ext uri="{FF2B5EF4-FFF2-40B4-BE49-F238E27FC236}">
-                <a16:creationId xmlns:a16="http://schemas.microsoft.com/office/drawing/2014/main" id="{70C56479-1FA2-4902-B788-F26F2DE86347}"/>
+          <p:cNvPr id="2" name="Content Placeholder 1">
+            <a:extLst>
+              <a:ext uri="{FF2B5EF4-FFF2-40B4-BE49-F238E27FC236}">
+                <a16:creationId xmlns:a16="http://schemas.microsoft.com/office/drawing/2014/main" id="{44ACA91E-AD87-4172-B4AD-76C48F4FA84A}"/>
               </a:ext>
             </a:extLst>
           </p:cNvPr>
@@ -15595,333 +15735,27 @@
           <a:p>
             <a:r>
               <a:rPr lang="fa-IR" dirty="0"/>
-              <a:t>پردازش بسته‌ها در شبکه‌های پهن‌باند: پردازش دسته‌ای، پردازش جریانی</a:t>
-            </a:r>
+              <a:t> پردازش دسته‌ای: مشکلات</a:t>
+            </a:r>
+          </a:p>
+          <a:p>
+            <a:endParaRPr lang="fa-IR" dirty="0"/>
           </a:p>
           <a:p>
             <a:r>
               <a:rPr lang="fa-IR" dirty="0"/>
-              <a:t>پردازش جریانی:</a:t>
-            </a:r>
-          </a:p>
-          <a:p>
-            <a:pPr lvl="1"/>
-            <a:r>
-              <a:rPr lang="fa-IR" dirty="0"/>
-              <a:t>جریان بی وقفه اطلاعات</a:t>
-            </a:r>
-          </a:p>
-          <a:p>
-            <a:pPr lvl="1"/>
-            <a:r>
-              <a:rPr lang="fa-IR" dirty="0"/>
-              <a:t>محدودیت زمانی و حافظه</a:t>
-            </a:r>
-          </a:p>
-          <a:p>
-            <a:pPr lvl="1"/>
-            <a:r>
-              <a:rPr lang="fa-IR" dirty="0"/>
-              <a:t>مدل ترنستیل: </a:t>
-            </a:r>
-          </a:p>
-          <a:p>
-            <a:pPr marL="457200" indent="0" algn="l" rtl="0">
-              <a:buNone/>
-            </a:pPr>
-            <a:r>
-              <a:rPr lang="en-US" sz="1800" i="1" dirty="0">
-                <a:effectLst/>
-                <a:latin typeface="Times New Roman" panose="02020603050405020304" pitchFamily="18" charset="0"/>
-                <a:ea typeface="Calibri" panose="020F0502020204030204" pitchFamily="34" charset="0"/>
-                <a:cs typeface="Times New Roman" panose="02020603050405020304" pitchFamily="18" charset="0"/>
-              </a:rPr>
-              <a:t>I = α</a:t>
-            </a:r>
-            <a:r>
-              <a:rPr lang="en-US" sz="1800" i="1" baseline="-25000" dirty="0">
-                <a:effectLst/>
-                <a:latin typeface="Times New Roman" panose="02020603050405020304" pitchFamily="18" charset="0"/>
-                <a:ea typeface="Calibri" panose="020F0502020204030204" pitchFamily="34" charset="0"/>
-                <a:cs typeface="Times New Roman" panose="02020603050405020304" pitchFamily="18" charset="0"/>
-              </a:rPr>
-              <a:t>1</a:t>
-            </a:r>
-            <a:r>
-              <a:rPr lang="en-US" sz="1800" i="1" dirty="0">
-                <a:effectLst/>
-                <a:latin typeface="Times New Roman" panose="02020603050405020304" pitchFamily="18" charset="0"/>
-                <a:ea typeface="Calibri" panose="020F0502020204030204" pitchFamily="34" charset="0"/>
-                <a:cs typeface="Times New Roman" panose="02020603050405020304" pitchFamily="18" charset="0"/>
-              </a:rPr>
-              <a:t>, α</a:t>
-            </a:r>
-            <a:r>
-              <a:rPr lang="en-US" sz="1800" i="1" baseline="-25000" dirty="0">
-                <a:effectLst/>
-                <a:latin typeface="Times New Roman" panose="02020603050405020304" pitchFamily="18" charset="0"/>
-                <a:ea typeface="Calibri" panose="020F0502020204030204" pitchFamily="34" charset="0"/>
-                <a:cs typeface="Times New Roman" panose="02020603050405020304" pitchFamily="18" charset="0"/>
-              </a:rPr>
-              <a:t>2</a:t>
-            </a:r>
-            <a:r>
-              <a:rPr lang="en-US" sz="1800" i="1" dirty="0">
-                <a:effectLst/>
-                <a:latin typeface="Times New Roman" panose="02020603050405020304" pitchFamily="18" charset="0"/>
-                <a:ea typeface="Calibri" panose="020F0502020204030204" pitchFamily="34" charset="0"/>
-                <a:cs typeface="Times New Roman" panose="02020603050405020304" pitchFamily="18" charset="0"/>
-              </a:rPr>
-              <a:t>, α</a:t>
-            </a:r>
-            <a:r>
-              <a:rPr lang="en-US" sz="1800" i="1" baseline="-25000" dirty="0">
-                <a:effectLst/>
-                <a:latin typeface="Times New Roman" panose="02020603050405020304" pitchFamily="18" charset="0"/>
-                <a:ea typeface="Calibri" panose="020F0502020204030204" pitchFamily="34" charset="0"/>
-                <a:cs typeface="Times New Roman" panose="02020603050405020304" pitchFamily="18" charset="0"/>
-              </a:rPr>
-              <a:t>3</a:t>
-            </a:r>
-            <a:r>
-              <a:rPr lang="en-US" sz="1800" i="1" dirty="0">
-                <a:effectLst/>
-                <a:latin typeface="Times New Roman" panose="02020603050405020304" pitchFamily="18" charset="0"/>
-                <a:ea typeface="Calibri" panose="020F0502020204030204" pitchFamily="34" charset="0"/>
-                <a:cs typeface="Times New Roman" panose="02020603050405020304" pitchFamily="18" charset="0"/>
-              </a:rPr>
-              <a:t>, α</a:t>
-            </a:r>
-            <a:r>
-              <a:rPr lang="en-US" sz="1800" i="1" baseline="-25000" dirty="0">
-                <a:effectLst/>
-                <a:latin typeface="Times New Roman" panose="02020603050405020304" pitchFamily="18" charset="0"/>
-                <a:ea typeface="Calibri" panose="020F0502020204030204" pitchFamily="34" charset="0"/>
-                <a:cs typeface="Times New Roman" panose="02020603050405020304" pitchFamily="18" charset="0"/>
-              </a:rPr>
-              <a:t>4</a:t>
-            </a:r>
-            <a:r>
-              <a:rPr lang="en-US" sz="1800" i="1" dirty="0">
-                <a:effectLst/>
-                <a:latin typeface="Times New Roman" panose="02020603050405020304" pitchFamily="18" charset="0"/>
-                <a:ea typeface="Calibri" panose="020F0502020204030204" pitchFamily="34" charset="0"/>
-                <a:cs typeface="Times New Roman" panose="02020603050405020304" pitchFamily="18" charset="0"/>
-              </a:rPr>
-              <a:t>,…                                                 </a:t>
-            </a:r>
-            <a:r>
-              <a:rPr lang="fa-IR" sz="1800" i="1" dirty="0">
-                <a:effectLst/>
-                <a:latin typeface="Times New Roman" panose="02020603050405020304" pitchFamily="18" charset="0"/>
-                <a:ea typeface="Calibri" panose="020F0502020204030204" pitchFamily="34" charset="0"/>
-                <a:cs typeface="Times New Roman" panose="02020603050405020304" pitchFamily="18" charset="0"/>
-              </a:rPr>
-              <a:t>کلید‌ها و مقادیر آپدیت در دنیای شبکه</a:t>
-            </a:r>
-            <a:endParaRPr lang="en-US" sz="1800" dirty="0">
-              <a:effectLst/>
-              <a:latin typeface="Times New Roman" panose="02020603050405020304" pitchFamily="18" charset="0"/>
-              <a:ea typeface="Calibri" panose="020F0502020204030204" pitchFamily="34" charset="0"/>
-              <a:cs typeface="Times New Roman" panose="02020603050405020304" pitchFamily="18" charset="0"/>
-            </a:endParaRPr>
-          </a:p>
-          <a:p>
-            <a:pPr marL="457200" indent="0" algn="l" rtl="0">
-              <a:spcAft>
-                <a:spcPts val="750"/>
-              </a:spcAft>
-              <a:buNone/>
-            </a:pPr>
-            <a:r>
-              <a:rPr lang="en-US" sz="1800" i="1" dirty="0">
-                <a:effectLst/>
-                <a:latin typeface="Times New Roman" panose="02020603050405020304" pitchFamily="18" charset="0"/>
-                <a:ea typeface="Calibri" panose="020F0502020204030204" pitchFamily="34" charset="0"/>
-                <a:cs typeface="Times New Roman" panose="02020603050405020304" pitchFamily="18" charset="0"/>
-              </a:rPr>
-              <a:t>Ɐα</a:t>
-            </a:r>
-            <a:r>
-              <a:rPr lang="en-US" sz="1800" i="1" baseline="-25000" dirty="0" err="1">
-                <a:effectLst/>
-                <a:latin typeface="Times New Roman" panose="02020603050405020304" pitchFamily="18" charset="0"/>
-                <a:ea typeface="Calibri" panose="020F0502020204030204" pitchFamily="34" charset="0"/>
-                <a:cs typeface="Times New Roman" panose="02020603050405020304" pitchFamily="18" charset="0"/>
-              </a:rPr>
-              <a:t>i</a:t>
-            </a:r>
-            <a:r>
-              <a:rPr lang="en-US" sz="1800" i="1" baseline="-25000" dirty="0">
-                <a:effectLst/>
-                <a:latin typeface="Times New Roman" panose="02020603050405020304" pitchFamily="18" charset="0"/>
-                <a:ea typeface="Calibri" panose="020F0502020204030204" pitchFamily="34" charset="0"/>
-                <a:cs typeface="Times New Roman" panose="02020603050405020304" pitchFamily="18" charset="0"/>
-              </a:rPr>
-              <a:t> </a:t>
-            </a:r>
-            <a:r>
-              <a:rPr lang="en-US" sz="1800" i="1" dirty="0">
-                <a:effectLst/>
-                <a:latin typeface="Times New Roman" panose="02020603050405020304" pitchFamily="18" charset="0"/>
-                <a:ea typeface="Calibri" panose="020F0502020204030204" pitchFamily="34" charset="0"/>
-                <a:cs typeface="Times New Roman" panose="02020603050405020304" pitchFamily="18" charset="0"/>
-              </a:rPr>
-              <a:t>= {( a</a:t>
-            </a:r>
-            <a:r>
-              <a:rPr lang="de-DE" sz="1800" i="1" baseline="-25000" dirty="0">
-                <a:effectLst/>
-                <a:latin typeface="Times New Roman" panose="02020603050405020304" pitchFamily="18" charset="0"/>
-                <a:ea typeface="Calibri" panose="020F0502020204030204" pitchFamily="34" charset="0"/>
-                <a:cs typeface="Times New Roman" panose="02020603050405020304" pitchFamily="18" charset="0"/>
-              </a:rPr>
-              <a:t>i</a:t>
-            </a:r>
-            <a:r>
-              <a:rPr lang="en-US" sz="1800" i="1" dirty="0">
-                <a:effectLst/>
-                <a:latin typeface="Times New Roman" panose="02020603050405020304" pitchFamily="18" charset="0"/>
-                <a:ea typeface="Calibri" panose="020F0502020204030204" pitchFamily="34" charset="0"/>
-                <a:cs typeface="Times New Roman" panose="02020603050405020304" pitchFamily="18" charset="0"/>
-              </a:rPr>
-              <a:t>, v</a:t>
-            </a:r>
-            <a:r>
-              <a:rPr lang="en-US" sz="1800" i="1" baseline="-25000" dirty="0">
-                <a:latin typeface="Times New Roman" panose="02020603050405020304" pitchFamily="18" charset="0"/>
-                <a:ea typeface="Calibri" panose="020F0502020204030204" pitchFamily="34" charset="0"/>
-                <a:cs typeface="Times New Roman" panose="02020603050405020304" pitchFamily="18" charset="0"/>
-              </a:rPr>
-              <a:t>i</a:t>
-            </a:r>
-            <a:r>
-              <a:rPr lang="en-US" sz="1800" i="1" dirty="0">
-                <a:effectLst/>
-                <a:latin typeface="Times New Roman" panose="02020603050405020304" pitchFamily="18" charset="0"/>
-                <a:ea typeface="Calibri" panose="020F0502020204030204" pitchFamily="34" charset="0"/>
-                <a:cs typeface="Times New Roman" panose="02020603050405020304" pitchFamily="18" charset="0"/>
-              </a:rPr>
-              <a:t>) | </a:t>
-            </a:r>
-            <a:r>
-              <a:rPr lang="en-US" sz="1800" i="1" dirty="0" err="1">
-                <a:effectLst/>
-                <a:latin typeface="Times New Roman" panose="02020603050405020304" pitchFamily="18" charset="0"/>
-                <a:ea typeface="Calibri" panose="020F0502020204030204" pitchFamily="34" charset="0"/>
-                <a:cs typeface="Times New Roman" panose="02020603050405020304" pitchFamily="18" charset="0"/>
-              </a:rPr>
-              <a:t>a</a:t>
-            </a:r>
-            <a:r>
-              <a:rPr lang="en-US" sz="1800" i="1" baseline="-25000" dirty="0" err="1">
-                <a:latin typeface="Times New Roman" panose="02020603050405020304" pitchFamily="18" charset="0"/>
-                <a:ea typeface="Calibri" panose="020F0502020204030204" pitchFamily="34" charset="0"/>
-                <a:cs typeface="Times New Roman" panose="02020603050405020304" pitchFamily="18" charset="0"/>
-              </a:rPr>
-              <a:t>i</a:t>
-            </a:r>
-            <a:r>
-              <a:rPr lang="en-US" sz="1800" i="1" dirty="0" err="1">
-                <a:effectLst/>
-                <a:latin typeface="Times New Roman" panose="02020603050405020304" pitchFamily="18" charset="0"/>
-                <a:ea typeface="Calibri" panose="020F0502020204030204" pitchFamily="34" charset="0"/>
-                <a:cs typeface="Times New Roman" panose="02020603050405020304" pitchFamily="18" charset="0"/>
-              </a:rPr>
-              <a:t>Ɛ</a:t>
-            </a:r>
-            <a:r>
-              <a:rPr lang="en-US" sz="1800" i="1" dirty="0">
-                <a:effectLst/>
-                <a:latin typeface="Times New Roman" panose="02020603050405020304" pitchFamily="18" charset="0"/>
-                <a:ea typeface="Calibri" panose="020F0502020204030204" pitchFamily="34" charset="0"/>
-                <a:cs typeface="Times New Roman" panose="02020603050405020304" pitchFamily="18" charset="0"/>
-              </a:rPr>
-              <a:t>{0,1,…,u-1}, </a:t>
-            </a:r>
-            <a:r>
-              <a:rPr lang="en-US" sz="1800" i="1" dirty="0" err="1">
-                <a:effectLst/>
-                <a:latin typeface="Times New Roman" panose="02020603050405020304" pitchFamily="18" charset="0"/>
-                <a:ea typeface="Calibri" panose="020F0502020204030204" pitchFamily="34" charset="0"/>
-                <a:cs typeface="Times New Roman" panose="02020603050405020304" pitchFamily="18" charset="0"/>
-              </a:rPr>
-              <a:t>v</a:t>
-            </a:r>
-            <a:r>
-              <a:rPr lang="en-US" sz="1800" i="1" baseline="-25000" dirty="0" err="1">
-                <a:latin typeface="Times New Roman" panose="02020603050405020304" pitchFamily="18" charset="0"/>
-                <a:ea typeface="Calibri" panose="020F0502020204030204" pitchFamily="34" charset="0"/>
-                <a:cs typeface="Times New Roman" panose="02020603050405020304" pitchFamily="18" charset="0"/>
-              </a:rPr>
-              <a:t>i</a:t>
-            </a:r>
-            <a:r>
-              <a:rPr lang="en-US" sz="1800" i="1" dirty="0" err="1">
-                <a:effectLst/>
-                <a:latin typeface="Times New Roman" panose="02020603050405020304" pitchFamily="18" charset="0"/>
-                <a:ea typeface="Calibri" panose="020F0502020204030204" pitchFamily="34" charset="0"/>
-                <a:cs typeface="Times New Roman" panose="02020603050405020304" pitchFamily="18" charset="0"/>
-              </a:rPr>
-              <a:t>ƐR</a:t>
-            </a:r>
-            <a:r>
-              <a:rPr lang="en-US" sz="1800" i="1" dirty="0">
-                <a:effectLst/>
-                <a:latin typeface="Times New Roman" panose="02020603050405020304" pitchFamily="18" charset="0"/>
-                <a:ea typeface="Calibri" panose="020F0502020204030204" pitchFamily="34" charset="0"/>
-                <a:cs typeface="Times New Roman" panose="02020603050405020304" pitchFamily="18" charset="0"/>
-              </a:rPr>
-              <a:t>}                                      </a:t>
-            </a:r>
-            <a:endParaRPr lang="en-US" sz="1800" b="0" dirty="0">
-              <a:effectLst/>
-              <a:latin typeface="Times New Roman" panose="02020603050405020304" pitchFamily="18" charset="0"/>
-              <a:ea typeface="Calibri" panose="020F0502020204030204" pitchFamily="34" charset="0"/>
-            </a:endParaRPr>
-          </a:p>
-          <a:p>
-            <a:r>
-              <a:rPr lang="fa-IR" dirty="0"/>
-              <a:t>مسایل مطرح در حوزه داده جریان:</a:t>
-            </a:r>
-          </a:p>
-          <a:p>
-            <a:pPr lvl="1"/>
-            <a:r>
-              <a:rPr lang="fa-IR" dirty="0"/>
-              <a:t>سایز هر جریان</a:t>
-            </a:r>
-          </a:p>
-          <a:p>
-            <a:pPr lvl="1"/>
-            <a:r>
-              <a:rPr lang="fa-IR" dirty="0"/>
-              <a:t>لحظه جریان</a:t>
-            </a:r>
-          </a:p>
-          <a:p>
-            <a:pPr lvl="1"/>
-            <a:r>
-              <a:rPr lang="fa-IR" dirty="0"/>
-              <a:t>شاخص‌ها</a:t>
-            </a:r>
-          </a:p>
-          <a:p>
-            <a:pPr lvl="2"/>
-            <a:endParaRPr lang="fa-IR" dirty="0"/>
-          </a:p>
-          <a:p>
+              <a:t>پردازش جریانی</a:t>
+            </a:r>
             <a:endParaRPr lang="en-US" dirty="0"/>
           </a:p>
         </p:txBody>
       </p:sp>
       <p:sp>
         <p:nvSpPr>
-          <p:cNvPr id="5" name="Text Placeholder 4">
-            <a:extLst>
-              <a:ext uri="{FF2B5EF4-FFF2-40B4-BE49-F238E27FC236}">
-                <a16:creationId xmlns:a16="http://schemas.microsoft.com/office/drawing/2014/main" id="{04A5F9DE-BFDC-4726-BF08-8D751F5E33B1}"/>
+          <p:cNvPr id="3" name="Text Placeholder 2">
+            <a:extLst>
+              <a:ext uri="{FF2B5EF4-FFF2-40B4-BE49-F238E27FC236}">
+                <a16:creationId xmlns:a16="http://schemas.microsoft.com/office/drawing/2014/main" id="{AB5C6B1B-7C29-48F7-AE60-E28E5F5C57F8}"/>
               </a:ext>
             </a:extLst>
           </p:cNvPr>
@@ -15934,8 +15768,8 @@
         </p:nvSpPr>
         <p:spPr>
           <a:xfrm>
-            <a:off x="5943600" y="82620"/>
-            <a:ext cx="6058431" cy="720725"/>
+            <a:off x="5361709" y="82620"/>
+            <a:ext cx="6640322" cy="720725"/>
           </a:xfrm>
         </p:spPr>
         <p:txBody>
@@ -15946,7 +15780,7 @@
           <a:p>
             <a:r>
               <a:rPr lang="fa-IR" dirty="0"/>
-              <a:t>داده جریان</a:t>
+              <a:t>پردازش بسته‌ها در شبکه‌های پهن‌باند:</a:t>
             </a:r>
             <a:endParaRPr lang="en-US" dirty="0"/>
           </a:p>
@@ -15955,7 +15789,7 @@
     </p:spTree>
     <p:extLst>
       <p:ext uri="{BB962C8B-B14F-4D97-AF65-F5344CB8AC3E}">
-        <p14:creationId xmlns:p14="http://schemas.microsoft.com/office/powerpoint/2010/main" val="3584695319"/>
+        <p14:creationId xmlns:p14="http://schemas.microsoft.com/office/powerpoint/2010/main" val="1882343522"/>
       </p:ext>
     </p:extLst>
   </p:cSld>
@@ -16005,49 +15839,315 @@
           <a:p>
             <a:r>
               <a:rPr lang="fa-IR" dirty="0"/>
-              <a:t>راهکاری برای حل مسایل داده جریان و جایگزین نمونه گیری</a:t>
-            </a:r>
-          </a:p>
-          <a:p>
+              <a:t>پردازش جریانی:</a:t>
+            </a:r>
+          </a:p>
+          <a:p>
+            <a:pPr lvl="1"/>
             <a:r>
               <a:rPr lang="fa-IR" dirty="0"/>
-              <a:t>انواع مختلف برای مسایل مختلف داده جریان</a:t>
+              <a:t>جریان بی وقفه اطلاعات</a:t>
             </a:r>
           </a:p>
           <a:p>
             <a:pPr lvl="1"/>
             <a:r>
               <a:rPr lang="fa-IR" dirty="0"/>
-              <a:t>انگاره شمارشی:</a:t>
+              <a:t>محدودیت زمانی و حافظه</a:t>
+            </a:r>
+          </a:p>
+          <a:p>
+            <a:pPr lvl="1"/>
+            <a:r>
+              <a:rPr lang="fa-IR" dirty="0"/>
+              <a:t>مدل ترنستیل: </a:t>
+            </a:r>
+          </a:p>
+          <a:p>
+            <a:pPr marL="457200" indent="0" algn="l" rtl="0">
+              <a:buNone/>
+            </a:pPr>
+            <a:r>
+              <a:rPr lang="en-US" sz="1800" i="1" dirty="0">
+                <a:effectLst/>
+                <a:latin typeface="Times New Roman" panose="02020603050405020304" pitchFamily="18" charset="0"/>
+                <a:ea typeface="Calibri" panose="020F0502020204030204" pitchFamily="34" charset="0"/>
+                <a:cs typeface="Times New Roman" panose="02020603050405020304" pitchFamily="18" charset="0"/>
+              </a:rPr>
+              <a:t>I = α</a:t>
+            </a:r>
+            <a:r>
+              <a:rPr lang="en-US" sz="1800" i="1" baseline="-25000" dirty="0">
+                <a:effectLst/>
+                <a:latin typeface="Times New Roman" panose="02020603050405020304" pitchFamily="18" charset="0"/>
+                <a:ea typeface="Calibri" panose="020F0502020204030204" pitchFamily="34" charset="0"/>
+                <a:cs typeface="Times New Roman" panose="02020603050405020304" pitchFamily="18" charset="0"/>
+              </a:rPr>
+              <a:t>1</a:t>
+            </a:r>
+            <a:r>
+              <a:rPr lang="en-US" sz="1800" i="1" dirty="0">
+                <a:effectLst/>
+                <a:latin typeface="Times New Roman" panose="02020603050405020304" pitchFamily="18" charset="0"/>
+                <a:ea typeface="Calibri" panose="020F0502020204030204" pitchFamily="34" charset="0"/>
+                <a:cs typeface="Times New Roman" panose="02020603050405020304" pitchFamily="18" charset="0"/>
+              </a:rPr>
+              <a:t>, α</a:t>
+            </a:r>
+            <a:r>
+              <a:rPr lang="en-US" sz="1800" i="1" baseline="-25000" dirty="0">
+                <a:effectLst/>
+                <a:latin typeface="Times New Roman" panose="02020603050405020304" pitchFamily="18" charset="0"/>
+                <a:ea typeface="Calibri" panose="020F0502020204030204" pitchFamily="34" charset="0"/>
+                <a:cs typeface="Times New Roman" panose="02020603050405020304" pitchFamily="18" charset="0"/>
+              </a:rPr>
+              <a:t>2</a:t>
+            </a:r>
+            <a:r>
+              <a:rPr lang="en-US" sz="1800" i="1" dirty="0">
+                <a:effectLst/>
+                <a:latin typeface="Times New Roman" panose="02020603050405020304" pitchFamily="18" charset="0"/>
+                <a:ea typeface="Calibri" panose="020F0502020204030204" pitchFamily="34" charset="0"/>
+                <a:cs typeface="Times New Roman" panose="02020603050405020304" pitchFamily="18" charset="0"/>
+              </a:rPr>
+              <a:t>, α</a:t>
+            </a:r>
+            <a:r>
+              <a:rPr lang="en-US" sz="1800" i="1" baseline="-25000" dirty="0">
+                <a:effectLst/>
+                <a:latin typeface="Times New Roman" panose="02020603050405020304" pitchFamily="18" charset="0"/>
+                <a:ea typeface="Calibri" panose="020F0502020204030204" pitchFamily="34" charset="0"/>
+                <a:cs typeface="Times New Roman" panose="02020603050405020304" pitchFamily="18" charset="0"/>
+              </a:rPr>
+              <a:t>3</a:t>
+            </a:r>
+            <a:r>
+              <a:rPr lang="en-US" sz="1800" i="1" dirty="0">
+                <a:effectLst/>
+                <a:latin typeface="Times New Roman" panose="02020603050405020304" pitchFamily="18" charset="0"/>
+                <a:ea typeface="Calibri" panose="020F0502020204030204" pitchFamily="34" charset="0"/>
+                <a:cs typeface="Times New Roman" panose="02020603050405020304" pitchFamily="18" charset="0"/>
+              </a:rPr>
+              <a:t>, α</a:t>
+            </a:r>
+            <a:r>
+              <a:rPr lang="en-US" sz="1800" i="1" baseline="-25000" dirty="0">
+                <a:effectLst/>
+                <a:latin typeface="Times New Roman" panose="02020603050405020304" pitchFamily="18" charset="0"/>
+                <a:ea typeface="Calibri" panose="020F0502020204030204" pitchFamily="34" charset="0"/>
+                <a:cs typeface="Times New Roman" panose="02020603050405020304" pitchFamily="18" charset="0"/>
+              </a:rPr>
+              <a:t>4</a:t>
+            </a:r>
+            <a:r>
+              <a:rPr lang="en-US" sz="1800" i="1" dirty="0">
+                <a:effectLst/>
+                <a:latin typeface="Times New Roman" panose="02020603050405020304" pitchFamily="18" charset="0"/>
+                <a:ea typeface="Calibri" panose="020F0502020204030204" pitchFamily="34" charset="0"/>
+                <a:cs typeface="Times New Roman" panose="02020603050405020304" pitchFamily="18" charset="0"/>
+              </a:rPr>
+              <a:t>,…                                                 </a:t>
+            </a:r>
+            <a:r>
+              <a:rPr lang="fa-IR" sz="1800" i="1" dirty="0">
+                <a:effectLst/>
+                <a:latin typeface="Times New Roman" panose="02020603050405020304" pitchFamily="18" charset="0"/>
+                <a:ea typeface="Calibri" panose="020F0502020204030204" pitchFamily="34" charset="0"/>
+                <a:cs typeface="Times New Roman" panose="02020603050405020304" pitchFamily="18" charset="0"/>
+              </a:rPr>
+              <a:t>کلید‌ها و مقادیر آپدیت در دنیای شبکه</a:t>
+            </a:r>
+            <a:endParaRPr lang="en-US" sz="1800" dirty="0">
+              <a:effectLst/>
+              <a:latin typeface="Times New Roman" panose="02020603050405020304" pitchFamily="18" charset="0"/>
+              <a:ea typeface="Calibri" panose="020F0502020204030204" pitchFamily="34" charset="0"/>
+              <a:cs typeface="Times New Roman" panose="02020603050405020304" pitchFamily="18" charset="0"/>
+            </a:endParaRPr>
+          </a:p>
+          <a:p>
+            <a:pPr marL="457200" indent="0" algn="l" rtl="0">
+              <a:spcAft>
+                <a:spcPts val="750"/>
+              </a:spcAft>
+              <a:buNone/>
+            </a:pPr>
+            <a:r>
+              <a:rPr lang="en-US" sz="1800" i="1" dirty="0">
+                <a:effectLst/>
+                <a:latin typeface="Times New Roman" panose="02020603050405020304" pitchFamily="18" charset="0"/>
+                <a:ea typeface="Calibri" panose="020F0502020204030204" pitchFamily="34" charset="0"/>
+                <a:cs typeface="Times New Roman" panose="02020603050405020304" pitchFamily="18" charset="0"/>
+              </a:rPr>
+              <a:t>Ɐα</a:t>
+            </a:r>
+            <a:r>
+              <a:rPr lang="en-US" sz="1800" i="1" baseline="-25000" dirty="0" err="1">
+                <a:effectLst/>
+                <a:latin typeface="Times New Roman" panose="02020603050405020304" pitchFamily="18" charset="0"/>
+                <a:ea typeface="Calibri" panose="020F0502020204030204" pitchFamily="34" charset="0"/>
+                <a:cs typeface="Times New Roman" panose="02020603050405020304" pitchFamily="18" charset="0"/>
+              </a:rPr>
+              <a:t>i</a:t>
+            </a:r>
+            <a:r>
+              <a:rPr lang="en-US" sz="1800" i="1" baseline="-25000" dirty="0">
+                <a:effectLst/>
+                <a:latin typeface="Times New Roman" panose="02020603050405020304" pitchFamily="18" charset="0"/>
+                <a:ea typeface="Calibri" panose="020F0502020204030204" pitchFamily="34" charset="0"/>
+                <a:cs typeface="Times New Roman" panose="02020603050405020304" pitchFamily="18" charset="0"/>
+              </a:rPr>
+              <a:t> </a:t>
+            </a:r>
+            <a:r>
+              <a:rPr lang="en-US" sz="1800" i="1" dirty="0">
+                <a:effectLst/>
+                <a:latin typeface="Times New Roman" panose="02020603050405020304" pitchFamily="18" charset="0"/>
+                <a:ea typeface="Calibri" panose="020F0502020204030204" pitchFamily="34" charset="0"/>
+                <a:cs typeface="Times New Roman" panose="02020603050405020304" pitchFamily="18" charset="0"/>
+              </a:rPr>
+              <a:t>= {( a</a:t>
+            </a:r>
+            <a:r>
+              <a:rPr lang="de-DE" sz="1800" i="1" baseline="-25000" dirty="0">
+                <a:effectLst/>
+                <a:latin typeface="Times New Roman" panose="02020603050405020304" pitchFamily="18" charset="0"/>
+                <a:ea typeface="Calibri" panose="020F0502020204030204" pitchFamily="34" charset="0"/>
+                <a:cs typeface="Times New Roman" panose="02020603050405020304" pitchFamily="18" charset="0"/>
+              </a:rPr>
+              <a:t>i</a:t>
+            </a:r>
+            <a:r>
+              <a:rPr lang="en-US" sz="1800" i="1" dirty="0">
+                <a:effectLst/>
+                <a:latin typeface="Times New Roman" panose="02020603050405020304" pitchFamily="18" charset="0"/>
+                <a:ea typeface="Calibri" panose="020F0502020204030204" pitchFamily="34" charset="0"/>
+                <a:cs typeface="Times New Roman" panose="02020603050405020304" pitchFamily="18" charset="0"/>
+              </a:rPr>
+              <a:t>, v</a:t>
+            </a:r>
+            <a:r>
+              <a:rPr lang="en-US" sz="1800" i="1" baseline="-25000" dirty="0">
+                <a:latin typeface="Times New Roman" panose="02020603050405020304" pitchFamily="18" charset="0"/>
+                <a:ea typeface="Calibri" panose="020F0502020204030204" pitchFamily="34" charset="0"/>
+                <a:cs typeface="Times New Roman" panose="02020603050405020304" pitchFamily="18" charset="0"/>
+              </a:rPr>
+              <a:t>i</a:t>
+            </a:r>
+            <a:r>
+              <a:rPr lang="en-US" sz="1800" i="1" dirty="0">
+                <a:effectLst/>
+                <a:latin typeface="Times New Roman" panose="02020603050405020304" pitchFamily="18" charset="0"/>
+                <a:ea typeface="Calibri" panose="020F0502020204030204" pitchFamily="34" charset="0"/>
+                <a:cs typeface="Times New Roman" panose="02020603050405020304" pitchFamily="18" charset="0"/>
+              </a:rPr>
+              <a:t>) | </a:t>
+            </a:r>
+            <a:r>
+              <a:rPr lang="en-US" sz="1800" i="1" dirty="0" err="1">
+                <a:effectLst/>
+                <a:latin typeface="Times New Roman" panose="02020603050405020304" pitchFamily="18" charset="0"/>
+                <a:ea typeface="Calibri" panose="020F0502020204030204" pitchFamily="34" charset="0"/>
+                <a:cs typeface="Times New Roman" panose="02020603050405020304" pitchFamily="18" charset="0"/>
+              </a:rPr>
+              <a:t>a</a:t>
+            </a:r>
+            <a:r>
+              <a:rPr lang="en-US" sz="1800" i="1" baseline="-25000" dirty="0" err="1">
+                <a:latin typeface="Times New Roman" panose="02020603050405020304" pitchFamily="18" charset="0"/>
+                <a:ea typeface="Calibri" panose="020F0502020204030204" pitchFamily="34" charset="0"/>
+                <a:cs typeface="Times New Roman" panose="02020603050405020304" pitchFamily="18" charset="0"/>
+              </a:rPr>
+              <a:t>i</a:t>
+            </a:r>
+            <a:r>
+              <a:rPr lang="en-US" sz="1800" i="1" dirty="0" err="1">
+                <a:effectLst/>
+                <a:latin typeface="Times New Roman" panose="02020603050405020304" pitchFamily="18" charset="0"/>
+                <a:ea typeface="Calibri" panose="020F0502020204030204" pitchFamily="34" charset="0"/>
+                <a:cs typeface="Times New Roman" panose="02020603050405020304" pitchFamily="18" charset="0"/>
+              </a:rPr>
+              <a:t>Ɛ</a:t>
+            </a:r>
+            <a:r>
+              <a:rPr lang="en-US" sz="1800" i="1" dirty="0">
+                <a:effectLst/>
+                <a:latin typeface="Times New Roman" panose="02020603050405020304" pitchFamily="18" charset="0"/>
+                <a:ea typeface="Calibri" panose="020F0502020204030204" pitchFamily="34" charset="0"/>
+                <a:cs typeface="Times New Roman" panose="02020603050405020304" pitchFamily="18" charset="0"/>
+              </a:rPr>
+              <a:t>{0,1,…,u-1}, </a:t>
+            </a:r>
+            <a:r>
+              <a:rPr lang="en-US" sz="1800" i="1" dirty="0" err="1">
+                <a:effectLst/>
+                <a:latin typeface="Times New Roman" panose="02020603050405020304" pitchFamily="18" charset="0"/>
+                <a:ea typeface="Calibri" panose="020F0502020204030204" pitchFamily="34" charset="0"/>
+                <a:cs typeface="Times New Roman" panose="02020603050405020304" pitchFamily="18" charset="0"/>
+              </a:rPr>
+              <a:t>v</a:t>
+            </a:r>
+            <a:r>
+              <a:rPr lang="en-US" sz="1800" i="1" baseline="-25000" dirty="0" err="1">
+                <a:latin typeface="Times New Roman" panose="02020603050405020304" pitchFamily="18" charset="0"/>
+                <a:ea typeface="Calibri" panose="020F0502020204030204" pitchFamily="34" charset="0"/>
+                <a:cs typeface="Times New Roman" panose="02020603050405020304" pitchFamily="18" charset="0"/>
+              </a:rPr>
+              <a:t>i</a:t>
+            </a:r>
+            <a:r>
+              <a:rPr lang="en-US" sz="1800" i="1" dirty="0" err="1">
+                <a:effectLst/>
+                <a:latin typeface="Times New Roman" panose="02020603050405020304" pitchFamily="18" charset="0"/>
+                <a:ea typeface="Calibri" panose="020F0502020204030204" pitchFamily="34" charset="0"/>
+                <a:cs typeface="Times New Roman" panose="02020603050405020304" pitchFamily="18" charset="0"/>
+              </a:rPr>
+              <a:t>ƐR</a:t>
+            </a:r>
+            <a:r>
+              <a:rPr lang="en-US" sz="1800" i="1" dirty="0">
+                <a:effectLst/>
+                <a:latin typeface="Times New Roman" panose="02020603050405020304" pitchFamily="18" charset="0"/>
+                <a:ea typeface="Calibri" panose="020F0502020204030204" pitchFamily="34" charset="0"/>
+                <a:cs typeface="Times New Roman" panose="02020603050405020304" pitchFamily="18" charset="0"/>
+              </a:rPr>
+              <a:t>}                                      </a:t>
+            </a:r>
+            <a:endParaRPr lang="en-US" sz="1800" b="0" dirty="0">
+              <a:effectLst/>
+              <a:latin typeface="Times New Roman" panose="02020603050405020304" pitchFamily="18" charset="0"/>
+              <a:ea typeface="Calibri" panose="020F0502020204030204" pitchFamily="34" charset="0"/>
+            </a:endParaRPr>
+          </a:p>
+          <a:p>
+            <a:r>
+              <a:rPr lang="fa-IR" dirty="0"/>
+              <a:t>مسایل مطرح در حوزه داده جریان:</a:t>
+            </a:r>
+          </a:p>
+          <a:p>
+            <a:pPr lvl="1"/>
+            <a:r>
+              <a:rPr lang="fa-IR" dirty="0"/>
+              <a:t>سایز هر جریان</a:t>
+            </a:r>
+          </a:p>
+          <a:p>
+            <a:pPr lvl="1"/>
+            <a:r>
+              <a:rPr lang="fa-IR" dirty="0"/>
+              <a:t>لحظه جریان</a:t>
+            </a:r>
+          </a:p>
+          <a:p>
+            <a:pPr lvl="1"/>
+            <a:r>
+              <a:rPr lang="fa-IR" dirty="0"/>
+              <a:t>شاخص‌ها</a:t>
             </a:r>
           </a:p>
           <a:p>
             <a:pPr lvl="2"/>
-            <a:r>
-              <a:rPr lang="fa-IR" dirty="0"/>
-              <a:t>کا تا توابع در هم نگار </a:t>
-            </a:r>
-          </a:p>
-          <a:p>
-            <a:pPr lvl="2"/>
-            <a:r>
-              <a:rPr lang="fa-IR" dirty="0"/>
-              <a:t>داده ساختارهای احتمالاتی</a:t>
-            </a:r>
-          </a:p>
-          <a:p>
-            <a:pPr lvl="1"/>
-            <a:r>
-              <a:rPr lang="fa-IR" dirty="0"/>
-              <a:t>انگاره شمارشی کمینه</a:t>
-            </a:r>
-          </a:p>
-          <a:p>
-            <a:pPr lvl="1"/>
-            <a:r>
-              <a:rPr lang="fa-IR" dirty="0"/>
-              <a:t>انگاره عمومی</a:t>
-            </a:r>
+            <a:endParaRPr lang="fa-IR" dirty="0"/>
           </a:p>
           <a:p>
             <a:endParaRPr lang="en-US" dirty="0"/>
@@ -16084,6 +16184,144 @@
           <a:p>
             <a:r>
               <a:rPr lang="fa-IR" dirty="0"/>
+              <a:t>پردازش جریانی</a:t>
+            </a:r>
+            <a:endParaRPr lang="en-US" dirty="0"/>
+          </a:p>
+        </p:txBody>
+      </p:sp>
+    </p:spTree>
+    <p:extLst>
+      <p:ext uri="{BB962C8B-B14F-4D97-AF65-F5344CB8AC3E}">
+        <p14:creationId xmlns:p14="http://schemas.microsoft.com/office/powerpoint/2010/main" val="3584695319"/>
+      </p:ext>
+    </p:extLst>
+  </p:cSld>
+  <p:clrMapOvr>
+    <a:masterClrMapping/>
+  </p:clrMapOvr>
+</p:sld>
+</file>
+
+<file path=ppt/slides/slide7.xml><?xml version="1.0" encoding="utf-8"?>
+<p:sld xmlns:a="http://schemas.openxmlformats.org/drawingml/2006/main" xmlns:r="http://schemas.openxmlformats.org/officeDocument/2006/relationships" xmlns:p="http://schemas.openxmlformats.org/presentationml/2006/main">
+  <p:cSld>
+    <p:spTree>
+      <p:nvGrpSpPr>
+        <p:cNvPr id="1" name=""/>
+        <p:cNvGrpSpPr/>
+        <p:nvPr/>
+      </p:nvGrpSpPr>
+      <p:grpSpPr>
+        <a:xfrm>
+          <a:off x="0" y="0"/>
+          <a:ext cx="0" cy="0"/>
+          <a:chOff x="0" y="0"/>
+          <a:chExt cx="0" cy="0"/>
+        </a:xfrm>
+      </p:grpSpPr>
+      <p:sp>
+        <p:nvSpPr>
+          <p:cNvPr id="4" name="Content Placeholder 3">
+            <a:extLst>
+              <a:ext uri="{FF2B5EF4-FFF2-40B4-BE49-F238E27FC236}">
+                <a16:creationId xmlns:a16="http://schemas.microsoft.com/office/drawing/2014/main" id="{70C56479-1FA2-4902-B788-F26F2DE86347}"/>
+              </a:ext>
+            </a:extLst>
+          </p:cNvPr>
+          <p:cNvSpPr>
+            <a:spLocks noGrp="1"/>
+          </p:cNvSpPr>
+          <p:nvPr>
+            <p:ph idx="1"/>
+          </p:nvPr>
+        </p:nvSpPr>
+        <p:spPr/>
+        <p:txBody>
+          <a:bodyPr/>
+          <a:lstStyle/>
+          <a:p>
+            <a:r>
+              <a:rPr lang="fa-IR" dirty="0"/>
+              <a:t>راهکاری برای حل مسایل داده جریان و جایگزین نمونه گیری</a:t>
+            </a:r>
+          </a:p>
+          <a:p>
+            <a:r>
+              <a:rPr lang="fa-IR" dirty="0"/>
+              <a:t>انواع مختلف برای مسایل مختلف داده جریان</a:t>
+            </a:r>
+          </a:p>
+          <a:p>
+            <a:pPr lvl="1"/>
+            <a:r>
+              <a:rPr lang="fa-IR" dirty="0"/>
+              <a:t>انگاره شمارشی:</a:t>
+            </a:r>
+          </a:p>
+          <a:p>
+            <a:pPr lvl="2"/>
+            <a:r>
+              <a:rPr lang="fa-IR" dirty="0"/>
+              <a:t>کا تا توابع در هم نگار </a:t>
+            </a:r>
+          </a:p>
+          <a:p>
+            <a:pPr lvl="2"/>
+            <a:r>
+              <a:rPr lang="fa-IR" dirty="0"/>
+              <a:t>داده ساختارهای احتمالاتی</a:t>
+            </a:r>
+          </a:p>
+          <a:p>
+            <a:pPr lvl="1"/>
+            <a:r>
+              <a:rPr lang="fa-IR" dirty="0"/>
+              <a:t>انگاره شمارشی کمینه</a:t>
+            </a:r>
+          </a:p>
+          <a:p>
+            <a:pPr lvl="1"/>
+            <a:r>
+              <a:rPr lang="fa-IR" dirty="0"/>
+              <a:t>انگاره عمومی</a:t>
+            </a:r>
+          </a:p>
+          <a:p>
+            <a:endParaRPr lang="en-US" dirty="0"/>
+          </a:p>
+        </p:txBody>
+      </p:sp>
+      <p:sp>
+        <p:nvSpPr>
+          <p:cNvPr id="5" name="Text Placeholder 4">
+            <a:extLst>
+              <a:ext uri="{FF2B5EF4-FFF2-40B4-BE49-F238E27FC236}">
+                <a16:creationId xmlns:a16="http://schemas.microsoft.com/office/drawing/2014/main" id="{04A5F9DE-BFDC-4726-BF08-8D751F5E33B1}"/>
+              </a:ext>
+            </a:extLst>
+          </p:cNvPr>
+          <p:cNvSpPr>
+            <a:spLocks noGrp="1"/>
+          </p:cNvSpPr>
+          <p:nvPr>
+            <p:ph type="body" sz="quarter" idx="10"/>
+          </p:nvPr>
+        </p:nvSpPr>
+        <p:spPr>
+          <a:xfrm>
+            <a:off x="5943600" y="82620"/>
+            <a:ext cx="6058431" cy="720725"/>
+          </a:xfrm>
+        </p:spPr>
+        <p:txBody>
+          <a:bodyPr>
+            <a:normAutofit/>
+          </a:bodyPr>
+          <a:lstStyle/>
+          <a:p>
+            <a:r>
+              <a:rPr lang="fa-IR" dirty="0"/>
               <a:t>انگاره‌ها</a:t>
             </a:r>
             <a:endParaRPr lang="en-US" dirty="0"/>
@@ -16103,7 +16341,7 @@
 </p:sld>
 </file>
 
-<file path=ppt/slides/slide7.xml><?xml version="1.0" encoding="utf-8"?>
+<file path=ppt/slides/slide8.xml><?xml version="1.0" encoding="utf-8"?>
 <p:sld xmlns:a="http://schemas.openxmlformats.org/drawingml/2006/main" xmlns:r="http://schemas.openxmlformats.org/officeDocument/2006/relationships" xmlns:p="http://schemas.openxmlformats.org/presentationml/2006/main">
   <p:cSld>
     <p:spTree>
@@ -21533,7 +21771,7 @@
 </p:sld>
 </file>
 
-<file path=ppt/slides/slide8.xml><?xml version="1.0" encoding="utf-8"?>
+<file path=ppt/slides/slide9.xml><?xml version="1.0" encoding="utf-8"?>
 <p:sld xmlns:a="http://schemas.openxmlformats.org/drawingml/2006/main" xmlns:r="http://schemas.openxmlformats.org/officeDocument/2006/relationships" xmlns:p="http://schemas.openxmlformats.org/presentationml/2006/main">
   <p:cSld>
     <p:spTree>
@@ -21774,145 +22012,6 @@
     <p:extLst>
       <p:ext uri="{BB962C8B-B14F-4D97-AF65-F5344CB8AC3E}">
         <p14:creationId xmlns:p14="http://schemas.microsoft.com/office/powerpoint/2010/main" val="3968956065"/>
-      </p:ext>
-    </p:extLst>
-  </p:cSld>
-  <p:clrMapOvr>
-    <a:masterClrMapping/>
-  </p:clrMapOvr>
-</p:sld>
-</file>
-
-<file path=ppt/slides/slide9.xml><?xml version="1.0" encoding="utf-8"?>
-<p:sld xmlns:a="http://schemas.openxmlformats.org/drawingml/2006/main" xmlns:r="http://schemas.openxmlformats.org/officeDocument/2006/relationships" xmlns:p="http://schemas.openxmlformats.org/presentationml/2006/main">
-  <p:cSld>
-    <p:spTree>
-      <p:nvGrpSpPr>
-        <p:cNvPr id="1" name=""/>
-        <p:cNvGrpSpPr/>
-        <p:nvPr/>
-      </p:nvGrpSpPr>
-      <p:grpSpPr>
-        <a:xfrm>
-          <a:off x="0" y="0"/>
-          <a:ext cx="0" cy="0"/>
-          <a:chOff x="0" y="0"/>
-          <a:chExt cx="0" cy="0"/>
-        </a:xfrm>
-      </p:grpSpPr>
-      <p:sp>
-        <p:nvSpPr>
-          <p:cNvPr id="2" name="Content Placeholder 1">
-            <a:extLst>
-              <a:ext uri="{FF2B5EF4-FFF2-40B4-BE49-F238E27FC236}">
-                <a16:creationId xmlns:a16="http://schemas.microsoft.com/office/drawing/2014/main" id="{FF49A6C7-DBE6-4D73-B240-F1117B733842}"/>
-              </a:ext>
-            </a:extLst>
-          </p:cNvPr>
-          <p:cNvSpPr>
-            <a:spLocks noGrp="1"/>
-          </p:cNvSpPr>
-          <p:nvPr>
-            <p:ph idx="1"/>
-          </p:nvPr>
-        </p:nvSpPr>
-        <p:spPr/>
-        <p:txBody>
-          <a:bodyPr/>
-          <a:lstStyle/>
-          <a:p>
-            <a:r>
-              <a:rPr lang="fa-IR" dirty="0"/>
-              <a:t>ارایه شده توسط اینتل در سال ۲۰۰۹</a:t>
-            </a:r>
-          </a:p>
-          <a:p>
-            <a:r>
-              <a:rPr lang="fa-IR" dirty="0"/>
-              <a:t>دور زدن کرنل</a:t>
-            </a:r>
-          </a:p>
-          <a:p>
-            <a:r>
-              <a:rPr lang="fa-IR" dirty="0"/>
-              <a:t>استفاده از مزیت‌های پردازنده‌های جند هسته‌ای </a:t>
-            </a:r>
-          </a:p>
-          <a:p>
-            <a:r>
-              <a:rPr lang="fa-IR" dirty="0"/>
-              <a:t>کاربردهای مختلف در ورودی/خروجی‌ها با نرخ بالا</a:t>
-            </a:r>
-          </a:p>
-          <a:p>
-            <a:r>
-              <a:rPr lang="fa-IR" dirty="0"/>
-              <a:t>مشکلات:</a:t>
-            </a:r>
-          </a:p>
-          <a:p>
-            <a:pPr lvl="1"/>
-            <a:r>
-              <a:rPr lang="fa-IR" dirty="0"/>
-              <a:t>نیاز به توسعه گرداننده رابط</a:t>
-            </a:r>
-          </a:p>
-          <a:p>
-            <a:pPr lvl="1"/>
-            <a:r>
-              <a:rPr lang="fa-IR" dirty="0"/>
-              <a:t>عدم امکان استفاده از مزیت‌ها فراهم شده توسط هسته</a:t>
-            </a:r>
-          </a:p>
-          <a:p>
-            <a:pPr lvl="1"/>
-            <a:r>
-              <a:rPr lang="fa-IR" dirty="0"/>
-              <a:t>مشکل در برقرای ارتباط با اجزای دیگر سیستم عامل</a:t>
-            </a:r>
-          </a:p>
-        </p:txBody>
-      </p:sp>
-      <p:sp>
-        <p:nvSpPr>
-          <p:cNvPr id="3" name="Text Placeholder 2">
-            <a:extLst>
-              <a:ext uri="{FF2B5EF4-FFF2-40B4-BE49-F238E27FC236}">
-                <a16:creationId xmlns:a16="http://schemas.microsoft.com/office/drawing/2014/main" id="{516DF1BD-04EE-4223-8E92-F83B3D0760BD}"/>
-              </a:ext>
-            </a:extLst>
-          </p:cNvPr>
-          <p:cNvSpPr>
-            <a:spLocks noGrp="1"/>
-          </p:cNvSpPr>
-          <p:nvPr>
-            <p:ph type="body" sz="quarter" idx="10"/>
-          </p:nvPr>
-        </p:nvSpPr>
-        <p:spPr>
-          <a:xfrm>
-            <a:off x="4804229" y="82620"/>
-            <a:ext cx="7197802" cy="720725"/>
-          </a:xfrm>
-        </p:spPr>
-        <p:txBody>
-          <a:bodyPr>
-            <a:normAutofit/>
-          </a:bodyPr>
-          <a:lstStyle/>
-          <a:p>
-            <a:r>
-              <a:rPr lang="de-DE" dirty="0"/>
-              <a:t>Data Plane Development Kit</a:t>
-            </a:r>
-            <a:endParaRPr lang="en-US" dirty="0"/>
-          </a:p>
-        </p:txBody>
-      </p:sp>
-    </p:spTree>
-    <p:extLst>
-      <p:ext uri="{BB962C8B-B14F-4D97-AF65-F5344CB8AC3E}">
-        <p14:creationId xmlns:p14="http://schemas.microsoft.com/office/powerpoint/2010/main" val="384891644"/>
       </p:ext>
     </p:extLst>
   </p:cSld>

</xml_diff>